<commit_message>
latest version with updated ICA schematic layout and alphapower plots
</commit_message>
<xml_diff>
--- a/AAS 2017/Alphapower_Poster.pptx
+++ b/AAS 2017/Alphapower_Poster.pptx
@@ -127,20 +127,6 @@
 </p:cmAuthorLst>
 </file>
 
-<file path=ppt/comments/comment1.xml><?xml version="1.0" encoding="utf-8"?>
-<p:cmLst xmlns:a="http://schemas.openxmlformats.org/drawingml/2006/main" xmlns:r="http://schemas.openxmlformats.org/officeDocument/2006/relationships" xmlns:p="http://schemas.openxmlformats.org/presentationml/2006/main">
-  <p:cm authorId="2" dt="2017-02-03T14:46:37.971" idx="1">
-    <p:pos x="22800" y="1688"/>
-    <p:text>Need to find higher resolution image</p:text>
-    <p:extLst>
-      <p:ext uri="{C676402C-5697-4E1C-873F-D02D1690AC5C}">
-        <p15:threadingInfo xmlns:p15="http://schemas.microsoft.com/office/powerpoint/2012/main" timeZoneBias="480"/>
-      </p:ext>
-    </p:extLst>
-  </p:cm>
-</p:cmLst>
-</file>
-
 <file path=ppt/handoutMasters/handoutMaster1.xml><?xml version="1.0" encoding="utf-8"?>
 <p:handoutMaster xmlns:a="http://schemas.openxmlformats.org/drawingml/2006/main" xmlns:r="http://schemas.openxmlformats.org/officeDocument/2006/relationships" xmlns:p="http://schemas.openxmlformats.org/presentationml/2006/main">
   <p:cSld>
@@ -223,7 +209,7 @@
           <a:p>
             <a:fld id="{F1C0B079-A316-4C9B-B165-DF9EA8325D2C}" type="datetimeFigureOut">
               <a:rPr lang="en-US" smtClean="0"/>
-              <a:t>2/8/2017</a:t>
+              <a:t>2/9/2017</a:t>
             </a:fld>
             <a:endParaRPr lang="en-US" dirty="0"/>
           </a:p>
@@ -388,7 +374,7 @@
           <a:p>
             <a:fld id="{38F28AB8-57D1-494F-9851-055AD867E790}" type="datetimeFigureOut">
               <a:rPr lang="en-US" smtClean="0"/>
-              <a:t>2/8/2017</a:t>
+              <a:t>2/9/2017</a:t>
             </a:fld>
             <a:endParaRPr lang="en-US" dirty="0"/>
           </a:p>
@@ -846,7 +832,7 @@
           <a:p>
             <a:fld id="{ECAA57DF-1C19-4726-AB84-014692BAD8F5}" type="datetimeFigureOut">
               <a:rPr lang="en-US" smtClean="0"/>
-              <a:t>2/8/2017</a:t>
+              <a:t>2/9/2017</a:t>
             </a:fld>
             <a:endParaRPr lang="en-US" dirty="0"/>
           </a:p>
@@ -3500,7 +3486,7 @@
             <a:fld id="{ECAA57DF-1C19-4726-AB84-014692BAD8F5}" type="datetimeFigureOut">
               <a:rPr lang="en-US" smtClean="0"/>
               <a:pPr/>
-              <a:t>2/8/2017</a:t>
+              <a:t>2/9/2017</a:t>
             </a:fld>
             <a:endParaRPr lang="en-US" dirty="0"/>
           </a:p>
@@ -3966,7 +3952,7 @@
           <a:p>
             <a:r>
               <a:rPr lang="en-US" dirty="0"/>
-              <a:t>Are variations in speech-in-noise thresholds related to central inhibitory function?</a:t>
+              <a:t>Variations in speech-in-noise thresholds as it relates to central inhibitory function</a:t>
             </a:r>
           </a:p>
         </p:txBody>
@@ -4057,36 +4043,6 @@
           </a:p>
         </p:txBody>
       </p:sp>
-      <p:pic>
-        <p:nvPicPr>
-          <p:cNvPr id="36" name="Picture 35"/>
-          <p:cNvPicPr>
-            <a:picLocks noChangeAspect="1"/>
-          </p:cNvPicPr>
-          <p:nvPr/>
-        </p:nvPicPr>
-        <p:blipFill>
-          <a:blip r:embed="rId2">
-            <a:extLst>
-              <a:ext uri="{28A0092B-C50C-407E-A947-70E740481C1C}">
-                <a14:useLocalDpi xmlns:a14="http://schemas.microsoft.com/office/drawing/2010/main" val="0"/>
-              </a:ext>
-            </a:extLst>
-          </a:blip>
-          <a:stretch>
-            <a:fillRect/>
-          </a:stretch>
-        </p:blipFill>
-        <p:spPr>
-          <a:xfrm>
-            <a:off x="34835446" y="3409134"/>
-            <a:ext cx="8957981" cy="1621532"/>
-          </a:xfrm>
-          <a:prstGeom prst="rect">
-            <a:avLst/>
-          </a:prstGeom>
-        </p:spPr>
-      </p:pic>
       <p:sp>
         <p:nvSpPr>
           <p:cNvPr id="11" name="Content Placeholder 10"/>
@@ -4105,48 +4061,48 @@
         </p:spPr>
         <p:txBody>
           <a:bodyPr>
-            <a:normAutofit lnSpcReduction="10000"/>
+            <a:normAutofit/>
           </a:bodyPr>
           <a:lstStyle/>
           <a:p>
             <a:pPr algn="just"/>
             <a:r>
-              <a:rPr lang="en-US" dirty="0"/>
+              <a:rPr lang="en-US" sz="2400" dirty="0"/>
               <a:t>Speech understanding in the presence of background noise is a major issue for individuals with hearing impairment</a:t>
             </a:r>
           </a:p>
           <a:p>
             <a:pPr algn="just"/>
             <a:r>
-              <a:rPr lang="en-US" dirty="0"/>
+              <a:rPr lang="en-US" sz="2400" dirty="0"/>
               <a:t>Effects of aging and hearing loss on central inhibitory function could potentially contribute to poor speech in noise (SiN) performance</a:t>
             </a:r>
           </a:p>
           <a:p>
             <a:pPr algn="just"/>
             <a:r>
-              <a:rPr lang="en-US" dirty="0"/>
+              <a:rPr lang="en-US" sz="2400" dirty="0"/>
               <a:t>Cortical alpha (7.5-12.5Hz) activity is an indirect measure of central inhibition, and relates to speech understanding in noise</a:t>
             </a:r>
           </a:p>
           <a:p>
             <a:pPr algn="just"/>
             <a:r>
-              <a:rPr lang="en-US" dirty="0"/>
+              <a:rPr lang="en-US" sz="2400" dirty="0"/>
               <a:t>Alpha rhythms effects on SiN testing has been well studied, but less is known about how individual resting state alpha relates to SiN performance.</a:t>
             </a:r>
           </a:p>
           <a:p>
             <a:pPr algn="just"/>
             <a:r>
-              <a:rPr lang="en-US" dirty="0"/>
+              <a:rPr lang="en-US" sz="2400" dirty="0"/>
               <a:t>Increased alpha activity is believed to aid in the suppression of background noise as the listener focuses on the relevant signal stream, however decreases in cortical areas related to attention</a:t>
             </a:r>
           </a:p>
           <a:p>
             <a:pPr algn="just"/>
             <a:r>
-              <a:rPr lang="en-US" dirty="0"/>
+              <a:rPr lang="en-US" sz="2400" dirty="0"/>
               <a:t>Purpose of the present study was to examine if an individual’s inhibitory function, as defined by their resting state alpha activity, would predict sentences in noise (SNR) thresholds</a:t>
             </a:r>
           </a:p>
@@ -4154,7 +4110,7 @@
             <a:pPr marL="0" indent="0">
               <a:buNone/>
             </a:pPr>
-            <a:endParaRPr lang="en-US" dirty="0"/>
+            <a:endParaRPr lang="en-US" sz="2400" dirty="0"/>
           </a:p>
         </p:txBody>
       </p:sp>
@@ -4192,7 +4148,7 @@
         </p:nvSpPr>
         <p:spPr>
           <a:xfrm>
-            <a:off x="1143000" y="14992813"/>
+            <a:off x="1143000" y="14311882"/>
             <a:ext cx="12801600" cy="11853832"/>
           </a:xfrm>
         </p:spPr>
@@ -4411,7 +4367,7 @@
         </p:nvSpPr>
         <p:spPr>
           <a:xfrm>
-            <a:off x="15544799" y="7071359"/>
+            <a:off x="16132388" y="7598401"/>
             <a:ext cx="12393099" cy="1828483"/>
           </a:xfrm>
         </p:spPr>
@@ -4427,36 +4383,6 @@
             <a:r>
               <a:rPr lang="en-US" sz="4400" dirty="0"/>
               <a:t>Resting state alpha activity in the eyes open condition varied among hearing aid patients</a:t>
-            </a:r>
-          </a:p>
-        </p:txBody>
-      </p:sp>
-      <p:sp>
-        <p:nvSpPr>
-          <p:cNvPr id="16" name="Text Placeholder 15"/>
-          <p:cNvSpPr>
-            <a:spLocks noGrp="1"/>
-          </p:cNvSpPr>
-          <p:nvPr>
-            <p:ph type="body" sz="quarter" idx="29"/>
-          </p:nvPr>
-        </p:nvSpPr>
-        <p:spPr>
-          <a:xfrm>
-            <a:off x="15831865" y="5851467"/>
-            <a:ext cx="12801600" cy="1219200"/>
-          </a:xfrm>
-          <a:solidFill>
-            <a:schemeClr val="accent5"/>
-          </a:solidFill>
-        </p:spPr>
-        <p:txBody>
-          <a:bodyPr/>
-          <a:lstStyle/>
-          <a:p>
-            <a:r>
-              <a:rPr lang="en-US" dirty="0"/>
-              <a:t>results</a:t>
             </a:r>
           </a:p>
         </p:txBody>
@@ -4486,7 +4412,7 @@
           <a:p>
             <a:r>
               <a:rPr lang="en-US" dirty="0"/>
-              <a:t>4. conclusions</a:t>
+              <a:t>4. Conclusions</a:t>
             </a:r>
           </a:p>
         </p:txBody>
@@ -4539,7 +4465,7 @@
           <p:nvPr/>
         </p:nvPicPr>
         <p:blipFill>
-          <a:blip r:embed="rId3"/>
+          <a:blip r:embed="rId2"/>
           <a:stretch>
             <a:fillRect/>
           </a:stretch>
@@ -4590,7 +4516,12 @@
             <p:ph type="body" sz="quarter" idx="21"/>
           </p:nvPr>
         </p:nvSpPr>
-        <p:spPr/>
+        <p:spPr>
+          <a:xfrm>
+            <a:off x="16388770" y="5851467"/>
+            <a:ext cx="12801600" cy="1219200"/>
+          </a:xfrm>
+        </p:spPr>
         <p:txBody>
           <a:bodyPr/>
           <a:lstStyle/>
@@ -4614,7 +4545,7 @@
         </p:nvSpPr>
         <p:spPr>
           <a:xfrm>
-            <a:off x="1142683" y="13752757"/>
+            <a:off x="1142683" y="12811207"/>
             <a:ext cx="12801600" cy="1219200"/>
           </a:xfrm>
           <a:solidFill>
@@ -4670,6 +4601,35 @@
           </p:cNvPicPr>
           <p:nvPr>
             <p:ph sz="quarter" idx="32"/>
+          </p:nvPr>
+        </p:nvPicPr>
+        <p:blipFill>
+          <a:blip r:embed="rId3">
+            <a:extLst>
+              <a:ext uri="{28A0092B-C50C-407E-A947-70E740481C1C}">
+                <a14:useLocalDpi xmlns:a14="http://schemas.microsoft.com/office/drawing/2010/main" val="0"/>
+              </a:ext>
+            </a:extLst>
+          </a:blip>
+          <a:stretch>
+            <a:fillRect/>
+          </a:stretch>
+        </p:blipFill>
+        <p:spPr>
+          <a:xfrm>
+            <a:off x="30484879" y="9056886"/>
+            <a:ext cx="6316935" cy="4042545"/>
+          </a:xfrm>
+        </p:spPr>
+      </p:pic>
+      <p:pic>
+        <p:nvPicPr>
+          <p:cNvPr id="57" name="Content Placeholder 56"/>
+          <p:cNvPicPr>
+            <a:picLocks noGrp="1" noChangeAspect="1"/>
+          </p:cNvPicPr>
+          <p:nvPr>
+            <p:ph sz="quarter" idx="33"/>
           </p:nvPr>
         </p:nvPicPr>
         <p:blipFill>
@@ -4686,264 +4646,83 @@
         </p:blipFill>
         <p:spPr>
           <a:xfrm>
-            <a:off x="15831865" y="20099234"/>
-            <a:ext cx="6316935" cy="4042545"/>
-          </a:xfrm>
-        </p:spPr>
-      </p:pic>
-      <p:pic>
-        <p:nvPicPr>
-          <p:cNvPr id="57" name="Content Placeholder 56"/>
-          <p:cNvPicPr>
-            <a:picLocks noGrp="1" noChangeAspect="1"/>
-          </p:cNvPicPr>
-          <p:nvPr>
-            <p:ph sz="quarter" idx="33"/>
-          </p:nvPr>
-        </p:nvPicPr>
-        <p:blipFill>
-          <a:blip r:embed="rId5">
-            <a:extLst>
-              <a:ext uri="{28A0092B-C50C-407E-A947-70E740481C1C}">
-                <a14:useLocalDpi xmlns:a14="http://schemas.microsoft.com/office/drawing/2010/main" val="0"/>
-              </a:ext>
-            </a:extLst>
-          </a:blip>
-          <a:stretch>
-            <a:fillRect/>
-          </a:stretch>
-        </p:blipFill>
-        <p:spPr>
-          <a:xfrm>
-            <a:off x="16411114" y="27148002"/>
+            <a:off x="30889268" y="14457419"/>
             <a:ext cx="6762692" cy="4327809"/>
           </a:xfrm>
         </p:spPr>
       </p:pic>
       <p:grpSp>
         <p:nvGrpSpPr>
-          <p:cNvPr id="55" name="Group 54"/>
+          <p:cNvPr id="25" name="Group 24"/>
           <p:cNvGrpSpPr/>
           <p:nvPr/>
         </p:nvGrpSpPr>
         <p:grpSpPr>
           <a:xfrm>
-            <a:off x="15884259" y="8565617"/>
-            <a:ext cx="12122681" cy="6395917"/>
-            <a:chOff x="16223719" y="13619315"/>
-            <a:chExt cx="12122681" cy="6395917"/>
+            <a:off x="15999267" y="18139838"/>
+            <a:ext cx="14344879" cy="5288659"/>
+            <a:chOff x="15687058" y="19112441"/>
+            <a:chExt cx="14344879" cy="5288659"/>
           </a:xfrm>
         </p:grpSpPr>
-        <p:grpSp>
-          <p:nvGrpSpPr>
-            <p:cNvPr id="28" name="Group 27"/>
-            <p:cNvGrpSpPr/>
+        <p:pic>
+          <p:nvPicPr>
+            <p:cNvPr id="29" name="Picture 28"/>
+            <p:cNvPicPr>
+              <a:picLocks noChangeAspect="1"/>
+            </p:cNvPicPr>
             <p:nvPr/>
-          </p:nvGrpSpPr>
-          <p:grpSpPr>
+          </p:nvPicPr>
+          <p:blipFill rotWithShape="1">
+            <a:blip r:embed="rId5" cstate="print">
+              <a:extLst>
+                <a:ext uri="{28A0092B-C50C-407E-A947-70E740481C1C}">
+                  <a14:useLocalDpi xmlns:a14="http://schemas.microsoft.com/office/drawing/2010/main" val="0"/>
+                </a:ext>
+              </a:extLst>
+            </a:blip>
+            <a:srcRect t="7426" r="20174"/>
+            <a:stretch/>
+          </p:blipFill>
+          <p:spPr>
             <a:xfrm>
-              <a:off x="16304691" y="13619315"/>
-              <a:ext cx="12041709" cy="3160643"/>
-              <a:chOff x="16304691" y="13619315"/>
-              <a:chExt cx="12041709" cy="3160643"/>
+              <a:off x="15687058" y="19131063"/>
+              <a:ext cx="6059124" cy="5270037"/>
             </a:xfrm>
-          </p:grpSpPr>
-          <p:pic>
-            <p:nvPicPr>
-              <p:cNvPr id="29" name="Picture 28"/>
-              <p:cNvPicPr>
-                <a:picLocks noChangeAspect="1"/>
-              </p:cNvPicPr>
-              <p:nvPr/>
-            </p:nvPicPr>
-            <p:blipFill>
-              <a:blip r:embed="rId6" cstate="print">
-                <a:extLst>
-                  <a:ext uri="{28A0092B-C50C-407E-A947-70E740481C1C}">
-                    <a14:useLocalDpi xmlns:a14="http://schemas.microsoft.com/office/drawing/2010/main" val="0"/>
-                  </a:ext>
-                </a:extLst>
-              </a:blip>
-              <a:stretch>
-                <a:fillRect/>
-              </a:stretch>
-            </p:blipFill>
-            <p:spPr>
-              <a:xfrm>
-                <a:off x="20377146" y="13619315"/>
-                <a:ext cx="4214191" cy="3160643"/>
-              </a:xfrm>
-              <a:prstGeom prst="rect">
-                <a:avLst/>
-              </a:prstGeom>
-            </p:spPr>
-          </p:pic>
-          <p:pic>
-            <p:nvPicPr>
-              <p:cNvPr id="31" name="Picture 30"/>
-              <p:cNvPicPr>
-                <a:picLocks noChangeAspect="1"/>
-              </p:cNvPicPr>
-              <p:nvPr/>
-            </p:nvPicPr>
-            <p:blipFill>
-              <a:blip r:embed="rId7" cstate="print">
-                <a:extLst>
-                  <a:ext uri="{28A0092B-C50C-407E-A947-70E740481C1C}">
-                    <a14:useLocalDpi xmlns:a14="http://schemas.microsoft.com/office/drawing/2010/main" val="0"/>
-                  </a:ext>
-                </a:extLst>
-              </a:blip>
-              <a:stretch>
-                <a:fillRect/>
-              </a:stretch>
-            </p:blipFill>
-            <p:spPr>
-              <a:xfrm>
-                <a:off x="24589438" y="13790775"/>
-                <a:ext cx="3756962" cy="2817721"/>
-              </a:xfrm>
-              <a:prstGeom prst="rect">
-                <a:avLst/>
-              </a:prstGeom>
-            </p:spPr>
-          </p:pic>
-          <p:pic>
-            <p:nvPicPr>
-              <p:cNvPr id="33" name="Picture 32"/>
-              <p:cNvPicPr>
-                <a:picLocks noChangeAspect="1"/>
-              </p:cNvPicPr>
-              <p:nvPr/>
-            </p:nvPicPr>
-            <p:blipFill>
-              <a:blip r:embed="rId8">
-                <a:extLst>
-                  <a:ext uri="{28A0092B-C50C-407E-A947-70E740481C1C}">
-                    <a14:useLocalDpi xmlns:a14="http://schemas.microsoft.com/office/drawing/2010/main" val="0"/>
-                  </a:ext>
-                </a:extLst>
-              </a:blip>
-              <a:stretch>
-                <a:fillRect/>
-              </a:stretch>
-            </p:blipFill>
-            <p:spPr>
-              <a:xfrm>
-                <a:off x="16304691" y="13620739"/>
-                <a:ext cx="4212292" cy="3159219"/>
-              </a:xfrm>
-              <a:prstGeom prst="rect">
-                <a:avLst/>
-              </a:prstGeom>
-            </p:spPr>
-          </p:pic>
-        </p:grpSp>
-        <p:grpSp>
-          <p:nvGrpSpPr>
-            <p:cNvPr id="27" name="Group 26"/>
-            <p:cNvGrpSpPr/>
+            <a:prstGeom prst="rect">
+              <a:avLst/>
+            </a:prstGeom>
+          </p:spPr>
+        </p:pic>
+        <p:pic>
+          <p:nvPicPr>
+            <p:cNvPr id="44" name="Picture 43"/>
+            <p:cNvPicPr>
+              <a:picLocks noChangeAspect="1"/>
+            </p:cNvPicPr>
             <p:nvPr/>
-          </p:nvGrpSpPr>
-          <p:grpSpPr>
+          </p:nvPicPr>
+          <p:blipFill rotWithShape="1">
+            <a:blip r:embed="rId6" cstate="print">
+              <a:extLst>
+                <a:ext uri="{28A0092B-C50C-407E-A947-70E740481C1C}">
+                  <a14:useLocalDpi xmlns:a14="http://schemas.microsoft.com/office/drawing/2010/main" val="0"/>
+                </a:ext>
+              </a:extLst>
+            </a:blip>
+            <a:srcRect l="10253" t="6511"/>
+            <a:stretch/>
+          </p:blipFill>
+          <p:spPr>
             <a:xfrm>
-              <a:off x="16223719" y="16801886"/>
-              <a:ext cx="12122681" cy="3213346"/>
-              <a:chOff x="16175726" y="17651577"/>
-              <a:chExt cx="12122681" cy="3213346"/>
+              <a:off x="23299301" y="19112441"/>
+              <a:ext cx="6732636" cy="5260043"/>
             </a:xfrm>
-          </p:grpSpPr>
-          <p:pic>
-            <p:nvPicPr>
-              <p:cNvPr id="44" name="Picture 43"/>
-              <p:cNvPicPr>
-                <a:picLocks noChangeAspect="1"/>
-              </p:cNvPicPr>
-              <p:nvPr/>
-            </p:nvPicPr>
-            <p:blipFill>
-              <a:blip r:embed="rId9" cstate="print">
-                <a:extLst>
-                  <a:ext uri="{28A0092B-C50C-407E-A947-70E740481C1C}">
-                    <a14:useLocalDpi xmlns:a14="http://schemas.microsoft.com/office/drawing/2010/main" val="0"/>
-                  </a:ext>
-                </a:extLst>
-              </a:blip>
-              <a:stretch>
-                <a:fillRect/>
-              </a:stretch>
-            </p:blipFill>
-            <p:spPr>
-              <a:xfrm>
-                <a:off x="20455946" y="17834463"/>
-                <a:ext cx="4040612" cy="3030458"/>
-              </a:xfrm>
-              <a:prstGeom prst="rect">
-                <a:avLst/>
-              </a:prstGeom>
-            </p:spPr>
-          </p:pic>
-          <p:pic>
-            <p:nvPicPr>
-              <p:cNvPr id="45" name="Picture 44"/>
-              <p:cNvPicPr>
-                <a:picLocks noChangeAspect="1"/>
-              </p:cNvPicPr>
-              <p:nvPr/>
-            </p:nvPicPr>
-            <p:blipFill>
-              <a:blip r:embed="rId10" cstate="print">
-                <a:extLst>
-                  <a:ext uri="{28A0092B-C50C-407E-A947-70E740481C1C}">
-                    <a14:useLocalDpi xmlns:a14="http://schemas.microsoft.com/office/drawing/2010/main" val="0"/>
-                  </a:ext>
-                </a:extLst>
-              </a:blip>
-              <a:stretch>
-                <a:fillRect/>
-              </a:stretch>
-            </p:blipFill>
-            <p:spPr>
-              <a:xfrm>
-                <a:off x="24579046" y="17834461"/>
-                <a:ext cx="3719361" cy="2789520"/>
-              </a:xfrm>
-              <a:prstGeom prst="rect">
-                <a:avLst/>
-              </a:prstGeom>
-            </p:spPr>
-          </p:pic>
-          <p:pic>
-            <p:nvPicPr>
-              <p:cNvPr id="46" name="Picture 45"/>
-              <p:cNvPicPr>
-                <a:picLocks noChangeAspect="1"/>
-              </p:cNvPicPr>
-              <p:nvPr/>
-            </p:nvPicPr>
-            <p:blipFill>
-              <a:blip r:embed="rId11" cstate="print">
-                <a:extLst>
-                  <a:ext uri="{28A0092B-C50C-407E-A947-70E740481C1C}">
-                    <a14:useLocalDpi xmlns:a14="http://schemas.microsoft.com/office/drawing/2010/main" val="0"/>
-                  </a:ext>
-                </a:extLst>
-              </a:blip>
-              <a:stretch>
-                <a:fillRect/>
-              </a:stretch>
-            </p:blipFill>
-            <p:spPr>
-              <a:xfrm>
-                <a:off x="16175726" y="17651577"/>
-                <a:ext cx="4284461" cy="3213346"/>
-              </a:xfrm>
-              <a:prstGeom prst="rect">
-                <a:avLst/>
-              </a:prstGeom>
-            </p:spPr>
-          </p:pic>
-        </p:grpSp>
+            <a:prstGeom prst="rect">
+              <a:avLst/>
+            </a:prstGeom>
+          </p:spPr>
+        </p:pic>
       </p:grpSp>
       <p:sp>
         <p:nvSpPr>
@@ -4957,8 +4736,8 @@
         </p:nvSpPr>
         <p:spPr>
           <a:xfrm>
-            <a:off x="16895969" y="15254352"/>
-            <a:ext cx="2939960" cy="693118"/>
+            <a:off x="18925190" y="9824079"/>
+            <a:ext cx="6836229" cy="877346"/>
           </a:xfrm>
         </p:spPr>
         <p:txBody>
@@ -4967,12 +4746,12 @@
           </a:bodyPr>
           <a:lstStyle/>
           <a:p>
-            <a:pPr marL="0" indent="0">
+            <a:pPr marL="0" indent="0" algn="ctr">
               <a:buNone/>
             </a:pPr>
             <a:r>
-              <a:rPr lang="en-US" sz="1800" dirty="0"/>
-              <a:t>FFT – occipital channels</a:t>
+              <a:rPr lang="en-US" sz="3600" dirty="0"/>
+              <a:t>FFT – occipital channels </a:t>
             </a:r>
           </a:p>
         </p:txBody>
@@ -4989,22 +4768,30 @@
         </p:nvSpPr>
         <p:spPr>
           <a:xfrm>
-            <a:off x="20983223" y="15162972"/>
-            <a:ext cx="2939960" cy="693118"/>
+            <a:off x="18253675" y="16760538"/>
+            <a:ext cx="8663292" cy="1539646"/>
           </a:xfrm>
         </p:spPr>
         <p:txBody>
           <a:bodyPr>
-            <a:normAutofit fontScale="92500" lnSpcReduction="20000"/>
+            <a:normAutofit/>
           </a:bodyPr>
           <a:lstStyle/>
           <a:p>
-            <a:pPr marL="0" indent="0">
+            <a:pPr marL="0" indent="0" algn="ctr">
               <a:buNone/>
             </a:pPr>
             <a:r>
-              <a:rPr lang="en-US" sz="1800" dirty="0"/>
-              <a:t>Alpha power averaged across occipital channels</a:t>
+              <a:rPr lang="en-US" sz="3200" dirty="0"/>
+              <a:t>Alpha power </a:t>
+            </a:r>
+            <a:r>
+              <a:rPr lang="en-US" sz="3600" dirty="0"/>
+              <a:t>averaged</a:t>
+            </a:r>
+            <a:r>
+              <a:rPr lang="en-US" sz="3200" dirty="0"/>
+              <a:t> across occipital channels</a:t>
             </a:r>
           </a:p>
         </p:txBody>
@@ -5021,8 +4808,8 @@
         </p:nvSpPr>
         <p:spPr>
           <a:xfrm>
-            <a:off x="24997939" y="15127795"/>
-            <a:ext cx="2939960" cy="693118"/>
+            <a:off x="15083739" y="23952530"/>
+            <a:ext cx="15437626" cy="951725"/>
           </a:xfrm>
         </p:spPr>
         <p:txBody>
@@ -5031,12 +4818,12 @@
           </a:bodyPr>
           <a:lstStyle/>
           <a:p>
-            <a:pPr marL="0" indent="0">
+            <a:pPr marL="0" indent="0" algn="ctr">
               <a:buNone/>
             </a:pPr>
             <a:r>
-              <a:rPr lang="en-US" sz="1800" dirty="0"/>
-              <a:t>Topo-power in alpha band</a:t>
+              <a:rPr lang="en-US" sz="3600" dirty="0"/>
+              <a:t>Topographical representation of alpha band power</a:t>
             </a:r>
           </a:p>
         </p:txBody>
@@ -5053,13 +4840,13 @@
         </p:nvSpPr>
         <p:spPr>
           <a:xfrm>
-            <a:off x="16524449" y="16114802"/>
-            <a:ext cx="11413450" cy="1415566"/>
+            <a:off x="16878596" y="29642220"/>
+            <a:ext cx="11413450" cy="2971380"/>
           </a:xfrm>
         </p:spPr>
         <p:txBody>
           <a:bodyPr>
-            <a:normAutofit fontScale="92500"/>
+            <a:normAutofit/>
           </a:bodyPr>
           <a:lstStyle/>
           <a:p>
@@ -5067,7 +4854,7 @@
               <a:buNone/>
             </a:pPr>
             <a:r>
-              <a:rPr lang="en-US" sz="2400" dirty="0"/>
+              <a:rPr lang="en-US" dirty="0"/>
               <a:t>Figure 2. Individual subject differences in time frequency data during the eyes open condition.  Notice in the top row (subject 1) the increased activation in the alpha band (7.5-12.5Hz), while the bottom row (subject 2) shows no activation across different frequency bands.</a:t>
             </a:r>
           </a:p>
@@ -5085,7 +4872,7 @@
         </p:nvSpPr>
         <p:spPr>
           <a:xfrm>
-            <a:off x="15544799" y="17962182"/>
+            <a:off x="30742327" y="7409464"/>
             <a:ext cx="12393099" cy="1307968"/>
           </a:xfrm>
         </p:spPr>
@@ -5114,7 +4901,7 @@
           <p:nvPr/>
         </p:nvPicPr>
         <p:blipFill>
-          <a:blip r:embed="rId12">
+          <a:blip r:embed="rId7">
             <a:extLst>
               <a:ext uri="{28A0092B-C50C-407E-A947-70E740481C1C}">
                 <a14:useLocalDpi xmlns:a14="http://schemas.microsoft.com/office/drawing/2010/main" val="0"/>
@@ -5127,7 +4914,7 @@
         </p:blipFill>
         <p:spPr>
           <a:xfrm>
-            <a:off x="22389238" y="20002316"/>
+            <a:off x="37042252" y="8959968"/>
             <a:ext cx="6474732" cy="4143528"/>
           </a:xfrm>
           <a:prstGeom prst="rect">
@@ -5147,7 +4934,7 @@
         </p:nvSpPr>
         <p:spPr>
           <a:xfrm>
-            <a:off x="15965231" y="31475811"/>
+            <a:off x="30443385" y="18785228"/>
             <a:ext cx="12747714" cy="1167080"/>
           </a:xfrm>
         </p:spPr>
@@ -5179,7 +4966,7 @@
         </p:nvSpPr>
         <p:spPr>
           <a:xfrm>
-            <a:off x="16117631" y="24563187"/>
+            <a:off x="30465884" y="13280096"/>
             <a:ext cx="12747714" cy="1167080"/>
           </a:xfrm>
         </p:spPr>
@@ -5201,16 +4988,16 @@
       </p:sp>
       <p:grpSp>
         <p:nvGrpSpPr>
-          <p:cNvPr id="75" name="Group 74"/>
+          <p:cNvPr id="3" name="Group 2"/>
           <p:cNvGrpSpPr/>
           <p:nvPr/>
         </p:nvGrpSpPr>
         <p:grpSpPr>
           <a:xfrm>
-            <a:off x="11004108" y="29588763"/>
-            <a:ext cx="3717131" cy="2643333"/>
-            <a:chOff x="1262939" y="28487779"/>
-            <a:chExt cx="5826608" cy="4143427"/>
+            <a:off x="6946720" y="27264454"/>
+            <a:ext cx="2214018" cy="2013645"/>
+            <a:chOff x="6534133" y="26786855"/>
+            <a:chExt cx="2563859" cy="2331825"/>
           </a:xfrm>
         </p:grpSpPr>
         <p:grpSp>
@@ -5221,10 +5008,10 @@
           </p:nvGrpSpPr>
           <p:grpSpPr>
             <a:xfrm>
-              <a:off x="1262939" y="31295905"/>
-              <a:ext cx="5166304" cy="1335301"/>
-              <a:chOff x="1153553" y="271848"/>
-              <a:chExt cx="5166304" cy="1335301"/>
+              <a:off x="6534133" y="27638209"/>
+              <a:ext cx="2407579" cy="664662"/>
+              <a:chOff x="1153553" y="321274"/>
+              <a:chExt cx="5166304" cy="1285875"/>
             </a:xfrm>
           </p:grpSpPr>
           <p:pic>
@@ -5236,7 +5023,7 @@
               <p:nvPr/>
             </p:nvPicPr>
             <p:blipFill>
-              <a:blip r:embed="rId13"/>
+              <a:blip r:embed="rId8"/>
               <a:stretch>
                 <a:fillRect/>
               </a:stretch>
@@ -5260,15 +5047,15 @@
               <p:nvPr/>
             </p:nvPicPr>
             <p:blipFill>
-              <a:blip r:embed="rId14"/>
+              <a:blip r:embed="rId9"/>
               <a:stretch>
                 <a:fillRect/>
               </a:stretch>
             </p:blipFill>
             <p:spPr>
               <a:xfrm>
-                <a:off x="1153553" y="271848"/>
-                <a:ext cx="1700857" cy="1285875"/>
+                <a:off x="1153553" y="321274"/>
+                <a:ext cx="1635479" cy="1236449"/>
               </a:xfrm>
               <a:prstGeom prst="rect">
                 <a:avLst/>
@@ -5284,8 +5071,8 @@
           </p:nvGrpSpPr>
           <p:grpSpPr>
             <a:xfrm>
-              <a:off x="1274661" y="28487779"/>
-              <a:ext cx="5814886" cy="1483967"/>
+              <a:off x="6534133" y="26786855"/>
+              <a:ext cx="2379086" cy="676951"/>
               <a:chOff x="820692" y="2041888"/>
               <a:chExt cx="5814886" cy="1483967"/>
             </a:xfrm>
@@ -5299,7 +5086,7 @@
               <p:nvPr/>
             </p:nvPicPr>
             <p:blipFill>
-              <a:blip r:embed="rId15"/>
+              <a:blip r:embed="rId10"/>
               <a:stretch>
                 <a:fillRect/>
               </a:stretch>
@@ -5323,7 +5110,7 @@
               <p:nvPr/>
             </p:nvPicPr>
             <p:blipFill>
-              <a:blip r:embed="rId16"/>
+              <a:blip r:embed="rId11"/>
               <a:stretch>
                 <a:fillRect/>
               </a:stretch>
@@ -5347,8 +5134,8 @@
           </p:nvGrpSpPr>
           <p:grpSpPr>
             <a:xfrm>
-              <a:off x="1274661" y="29952696"/>
-              <a:ext cx="5814885" cy="1247775"/>
+              <a:off x="6537030" y="28505960"/>
+              <a:ext cx="2560962" cy="612720"/>
               <a:chOff x="610627" y="4281292"/>
               <a:chExt cx="5814885" cy="1247775"/>
             </a:xfrm>
@@ -5362,7 +5149,7 @@
               <p:nvPr/>
             </p:nvPicPr>
             <p:blipFill>
-              <a:blip r:embed="rId17"/>
+              <a:blip r:embed="rId12"/>
               <a:stretch>
                 <a:fillRect/>
               </a:stretch>
@@ -5386,7 +5173,7 @@
               <p:nvPr/>
             </p:nvPicPr>
             <p:blipFill>
-              <a:blip r:embed="rId18"/>
+              <a:blip r:embed="rId13"/>
               <a:stretch>
                 <a:fillRect/>
               </a:stretch>
@@ -5415,8 +5202,8 @@
         </p:nvSpPr>
         <p:spPr>
           <a:xfrm>
-            <a:off x="211352" y="32059351"/>
-            <a:ext cx="12747714" cy="1167080"/>
+            <a:off x="2573333" y="30940524"/>
+            <a:ext cx="11017118" cy="1167080"/>
           </a:xfrm>
         </p:spPr>
         <p:txBody>
@@ -5429,7 +5216,7 @@
               <a:buNone/>
             </a:pPr>
             <a:r>
-              <a:rPr lang="en-US" sz="2200" dirty="0"/>
+              <a:rPr lang="en-US" sz="2400" dirty="0"/>
               <a:t>Figure 1.  Raw EEG data before and after removal of biological artifacts using ICA.</a:t>
             </a:r>
           </a:p>
@@ -5444,7 +5231,7 @@
           <p:nvPr/>
         </p:nvPicPr>
         <p:blipFill rotWithShape="1">
-          <a:blip r:embed="rId19">
+          <a:blip r:embed="rId14">
             <a:extLst>
               <a:ext uri="{28A0092B-C50C-407E-A947-70E740481C1C}">
                 <a14:useLocalDpi xmlns:a14="http://schemas.microsoft.com/office/drawing/2010/main" val="0"/>
@@ -5456,8 +5243,8 @@
         </p:blipFill>
         <p:spPr>
           <a:xfrm>
-            <a:off x="10103119" y="17561328"/>
-            <a:ext cx="3590266" cy="3496703"/>
+            <a:off x="9912785" y="16635248"/>
+            <a:ext cx="5170954" cy="5036198"/>
           </a:xfrm>
           <a:prstGeom prst="rect">
             <a:avLst/>
@@ -5491,24 +5278,165 @@
           </a:p>
         </p:txBody>
       </p:sp>
+      <p:grpSp>
+        <p:nvGrpSpPr>
+          <p:cNvPr id="26" name="Group 25"/>
+          <p:cNvGrpSpPr/>
+          <p:nvPr/>
+        </p:nvGrpSpPr>
+        <p:grpSpPr>
+          <a:xfrm>
+            <a:off x="15371614" y="11136950"/>
+            <a:ext cx="14466702" cy="5248123"/>
+            <a:chOff x="15269028" y="12697030"/>
+            <a:chExt cx="14466702" cy="5248123"/>
+          </a:xfrm>
+        </p:grpSpPr>
+        <p:pic>
+          <p:nvPicPr>
+            <p:cNvPr id="2" name="Picture 1"/>
+            <p:cNvPicPr>
+              <a:picLocks noChangeAspect="1"/>
+            </p:cNvPicPr>
+            <p:nvPr/>
+          </p:nvPicPr>
+          <p:blipFill rotWithShape="1">
+            <a:blip r:embed="rId15">
+              <a:extLst>
+                <a:ext uri="{28A0092B-C50C-407E-A947-70E740481C1C}">
+                  <a14:useLocalDpi xmlns:a14="http://schemas.microsoft.com/office/drawing/2010/main" val="0"/>
+                </a:ext>
+              </a:extLst>
+            </a:blip>
+            <a:srcRect l="1088" t="6557"/>
+            <a:stretch/>
+          </p:blipFill>
+          <p:spPr>
+            <a:xfrm>
+              <a:off x="15269028" y="12697030"/>
+              <a:ext cx="7415247" cy="5241444"/>
+            </a:xfrm>
+            <a:prstGeom prst="rect">
+              <a:avLst/>
+            </a:prstGeom>
+          </p:spPr>
+        </p:pic>
+        <p:pic>
+          <p:nvPicPr>
+            <p:cNvPr id="5" name="Picture 4"/>
+            <p:cNvPicPr>
+              <a:picLocks noChangeAspect="1"/>
+            </p:cNvPicPr>
+            <p:nvPr/>
+          </p:nvPicPr>
+          <p:blipFill rotWithShape="1">
+            <a:blip r:embed="rId16">
+              <a:extLst>
+                <a:ext uri="{28A0092B-C50C-407E-A947-70E740481C1C}">
+                  <a14:useLocalDpi xmlns:a14="http://schemas.microsoft.com/office/drawing/2010/main" val="0"/>
+                </a:ext>
+              </a:extLst>
+            </a:blip>
+            <a:srcRect l="12494" t="7049"/>
+            <a:stretch/>
+          </p:blipFill>
+          <p:spPr>
+            <a:xfrm>
+              <a:off x="23225846" y="12758895"/>
+              <a:ext cx="6509884" cy="5186258"/>
+            </a:xfrm>
+            <a:prstGeom prst="rect">
+              <a:avLst/>
+            </a:prstGeom>
+          </p:spPr>
+        </p:pic>
+      </p:grpSp>
+      <p:grpSp>
+        <p:nvGrpSpPr>
+          <p:cNvPr id="32" name="Group 31"/>
+          <p:cNvGrpSpPr/>
+          <p:nvPr/>
+        </p:nvGrpSpPr>
+        <p:grpSpPr>
+          <a:xfrm>
+            <a:off x="17051190" y="25087992"/>
+            <a:ext cx="11068262" cy="4352925"/>
+            <a:chOff x="16944031" y="25811674"/>
+            <a:chExt cx="11068262" cy="4352925"/>
+          </a:xfrm>
+        </p:grpSpPr>
+        <p:pic>
+          <p:nvPicPr>
+            <p:cNvPr id="19" name="Picture 18"/>
+            <p:cNvPicPr>
+              <a:picLocks noChangeAspect="1"/>
+            </p:cNvPicPr>
+            <p:nvPr/>
+          </p:nvPicPr>
+          <p:blipFill rotWithShape="1">
+            <a:blip r:embed="rId17"/>
+            <a:srcRect r="11385"/>
+            <a:stretch/>
+          </p:blipFill>
+          <p:spPr>
+            <a:xfrm>
+              <a:off x="23725399" y="26068848"/>
+              <a:ext cx="4286894" cy="4095751"/>
+            </a:xfrm>
+            <a:prstGeom prst="rect">
+              <a:avLst/>
+            </a:prstGeom>
+          </p:spPr>
+        </p:pic>
+        <p:pic>
+          <p:nvPicPr>
+            <p:cNvPr id="24" name="Picture 23"/>
+            <p:cNvPicPr>
+              <a:picLocks noChangeAspect="1"/>
+            </p:cNvPicPr>
+            <p:nvPr/>
+          </p:nvPicPr>
+          <p:blipFill>
+            <a:blip r:embed="rId18"/>
+            <a:stretch>
+              <a:fillRect/>
+            </a:stretch>
+          </p:blipFill>
+          <p:spPr>
+            <a:xfrm>
+              <a:off x="16944031" y="25811674"/>
+              <a:ext cx="4562475" cy="4352925"/>
+            </a:xfrm>
+            <a:prstGeom prst="rect">
+              <a:avLst/>
+            </a:prstGeom>
+          </p:spPr>
+        </p:pic>
+      </p:grpSp>
       <p:pic>
         <p:nvPicPr>
-          <p:cNvPr id="3" name="Picture 2"/>
+          <p:cNvPr id="37" name="Picture 36"/>
           <p:cNvPicPr>
             <a:picLocks noChangeAspect="1"/>
           </p:cNvPicPr>
           <p:nvPr/>
         </p:nvPicPr>
         <p:blipFill>
-          <a:blip r:embed="rId20"/>
+          <a:blip r:embed="rId19" cstate="print">
+            <a:extLst>
+              <a:ext uri="{28A0092B-C50C-407E-A947-70E740481C1C}">
+                <a14:useLocalDpi xmlns:a14="http://schemas.microsoft.com/office/drawing/2010/main" val="0"/>
+              </a:ext>
+            </a:extLst>
+          </a:blip>
           <a:stretch>
             <a:fillRect/>
           </a:stretch>
         </p:blipFill>
         <p:spPr>
           <a:xfrm>
-            <a:off x="35719687" y="9857895"/>
-            <a:ext cx="8446374" cy="4639558"/>
+            <a:off x="10484047" y="26776490"/>
+            <a:ext cx="5822935" cy="3064108"/>
           </a:xfrm>
           <a:prstGeom prst="rect">
             <a:avLst/>
@@ -5517,94 +5445,415 @@
       </p:pic>
       <p:pic>
         <p:nvPicPr>
-          <p:cNvPr id="6" name="Picture 5"/>
+          <p:cNvPr id="41" name="Picture 40"/>
           <p:cNvPicPr>
             <a:picLocks noChangeAspect="1"/>
           </p:cNvPicPr>
           <p:nvPr/>
         </p:nvPicPr>
         <p:blipFill>
-          <a:blip r:embed="rId21"/>
+          <a:blip r:embed="rId20" cstate="print">
+            <a:extLst>
+              <a:ext uri="{28A0092B-C50C-407E-A947-70E740481C1C}">
+                <a14:useLocalDpi xmlns:a14="http://schemas.microsoft.com/office/drawing/2010/main" val="0"/>
+              </a:ext>
+            </a:extLst>
+          </a:blip>
           <a:stretch>
             <a:fillRect/>
           </a:stretch>
         </p:blipFill>
         <p:spPr>
           <a:xfrm>
-            <a:off x="28863970" y="9428580"/>
-            <a:ext cx="6136178" cy="3372736"/>
+            <a:off x="293783" y="26729389"/>
+            <a:ext cx="5415901" cy="2993644"/>
           </a:xfrm>
           <a:prstGeom prst="rect">
             <a:avLst/>
           </a:prstGeom>
         </p:spPr>
       </p:pic>
+      <p:grpSp>
+        <p:nvGrpSpPr>
+          <p:cNvPr id="125" name="Group 124"/>
+          <p:cNvGrpSpPr/>
+          <p:nvPr/>
+        </p:nvGrpSpPr>
+        <p:grpSpPr>
+          <a:xfrm rot="16200000">
+            <a:off x="5758001" y="27862426"/>
+            <a:ext cx="1022326" cy="812328"/>
+            <a:chOff x="3724276" y="28985780"/>
+            <a:chExt cx="2083279" cy="1832358"/>
+          </a:xfrm>
+        </p:grpSpPr>
+        <p:cxnSp>
+          <p:nvCxnSpPr>
+            <p:cNvPr id="93" name="Straight Arrow Connector 92"/>
+            <p:cNvCxnSpPr>
+              <a:cxnSpLocks/>
+            </p:cNvCxnSpPr>
+            <p:nvPr/>
+          </p:nvCxnSpPr>
+          <p:spPr>
+            <a:xfrm flipH="1">
+              <a:off x="3724276" y="30029191"/>
+              <a:ext cx="1045134" cy="741893"/>
+            </a:xfrm>
+            <a:prstGeom prst="straightConnector1">
+              <a:avLst/>
+            </a:prstGeom>
+            <a:ln w="28575">
+              <a:solidFill>
+                <a:schemeClr val="accent4"/>
+              </a:solidFill>
+              <a:prstDash val="sysDot"/>
+              <a:headEnd w="lg" len="med"/>
+              <a:tailEnd type="triangle"/>
+            </a:ln>
+          </p:spPr>
+          <p:style>
+            <a:lnRef idx="1">
+              <a:schemeClr val="accent1"/>
+            </a:lnRef>
+            <a:fillRef idx="0">
+              <a:schemeClr val="accent1"/>
+            </a:fillRef>
+            <a:effectRef idx="0">
+              <a:schemeClr val="accent1"/>
+            </a:effectRef>
+            <a:fontRef idx="minor">
+              <a:schemeClr val="tx1"/>
+            </a:fontRef>
+          </p:style>
+        </p:cxnSp>
+        <p:cxnSp>
+          <p:nvCxnSpPr>
+            <p:cNvPr id="96" name="Straight Connector 95"/>
+            <p:cNvCxnSpPr>
+              <a:cxnSpLocks/>
+            </p:cNvCxnSpPr>
+            <p:nvPr/>
+          </p:nvCxnSpPr>
+          <p:spPr>
+            <a:xfrm>
+              <a:off x="4769410" y="28985780"/>
+              <a:ext cx="1" cy="1030459"/>
+            </a:xfrm>
+            <a:prstGeom prst="line">
+              <a:avLst/>
+            </a:prstGeom>
+            <a:ln w="28575">
+              <a:solidFill>
+                <a:schemeClr val="accent4"/>
+              </a:solidFill>
+              <a:prstDash val="sysDot"/>
+            </a:ln>
+          </p:spPr>
+          <p:style>
+            <a:lnRef idx="1">
+              <a:schemeClr val="accent1"/>
+            </a:lnRef>
+            <a:fillRef idx="0">
+              <a:schemeClr val="accent1"/>
+            </a:fillRef>
+            <a:effectRef idx="0">
+              <a:schemeClr val="accent1"/>
+            </a:effectRef>
+            <a:fontRef idx="minor">
+              <a:schemeClr val="tx1"/>
+            </a:fontRef>
+          </p:style>
+        </p:cxnSp>
+        <p:cxnSp>
+          <p:nvCxnSpPr>
+            <p:cNvPr id="115" name="Straight Arrow Connector 114"/>
+            <p:cNvCxnSpPr>
+              <a:cxnSpLocks/>
+            </p:cNvCxnSpPr>
+            <p:nvPr/>
+          </p:nvCxnSpPr>
+          <p:spPr>
+            <a:xfrm>
+              <a:off x="4759964" y="30029191"/>
+              <a:ext cx="1047591" cy="728941"/>
+            </a:xfrm>
+            <a:prstGeom prst="straightConnector1">
+              <a:avLst/>
+            </a:prstGeom>
+            <a:ln w="28575">
+              <a:solidFill>
+                <a:schemeClr val="accent4"/>
+              </a:solidFill>
+              <a:prstDash val="sysDot"/>
+              <a:headEnd w="lg" len="med"/>
+              <a:tailEnd type="triangle"/>
+            </a:ln>
+          </p:spPr>
+          <p:style>
+            <a:lnRef idx="1">
+              <a:schemeClr val="accent1"/>
+            </a:lnRef>
+            <a:fillRef idx="0">
+              <a:schemeClr val="accent1"/>
+            </a:fillRef>
+            <a:effectRef idx="0">
+              <a:schemeClr val="accent1"/>
+            </a:effectRef>
+            <a:fontRef idx="minor">
+              <a:schemeClr val="tx1"/>
+            </a:fontRef>
+          </p:style>
+        </p:cxnSp>
+        <p:cxnSp>
+          <p:nvCxnSpPr>
+            <p:cNvPr id="120" name="Straight Arrow Connector 119"/>
+            <p:cNvCxnSpPr>
+              <a:cxnSpLocks/>
+            </p:cNvCxnSpPr>
+            <p:nvPr/>
+          </p:nvCxnSpPr>
+          <p:spPr>
+            <a:xfrm>
+              <a:off x="4769410" y="30042596"/>
+              <a:ext cx="0" cy="775542"/>
+            </a:xfrm>
+            <a:prstGeom prst="straightConnector1">
+              <a:avLst/>
+            </a:prstGeom>
+            <a:ln w="28575">
+              <a:solidFill>
+                <a:schemeClr val="accent4"/>
+              </a:solidFill>
+              <a:prstDash val="sysDot"/>
+              <a:headEnd w="lg" len="med"/>
+              <a:tailEnd type="triangle"/>
+            </a:ln>
+          </p:spPr>
+          <p:style>
+            <a:lnRef idx="1">
+              <a:schemeClr val="accent1"/>
+            </a:lnRef>
+            <a:fillRef idx="0">
+              <a:schemeClr val="accent1"/>
+            </a:fillRef>
+            <a:effectRef idx="0">
+              <a:schemeClr val="accent1"/>
+            </a:effectRef>
+            <a:fontRef idx="minor">
+              <a:schemeClr val="tx1"/>
+            </a:fontRef>
+          </p:style>
+        </p:cxnSp>
+      </p:grpSp>
+      <p:grpSp>
+        <p:nvGrpSpPr>
+          <p:cNvPr id="88" name="Group 87"/>
+          <p:cNvGrpSpPr/>
+          <p:nvPr/>
+        </p:nvGrpSpPr>
+        <p:grpSpPr>
+          <a:xfrm>
+            <a:off x="9235094" y="27826283"/>
+            <a:ext cx="977561" cy="956326"/>
+            <a:chOff x="9177338" y="27952955"/>
+            <a:chExt cx="1116574" cy="956326"/>
+          </a:xfrm>
+        </p:grpSpPr>
+        <p:cxnSp>
+          <p:nvCxnSpPr>
+            <p:cNvPr id="43" name="Straight Arrow Connector 42"/>
+            <p:cNvCxnSpPr>
+              <a:cxnSpLocks/>
+            </p:cNvCxnSpPr>
+            <p:nvPr/>
+          </p:nvCxnSpPr>
+          <p:spPr>
+            <a:xfrm>
+              <a:off x="9177338" y="28438411"/>
+              <a:ext cx="1116574" cy="0"/>
+            </a:xfrm>
+            <a:prstGeom prst="straightConnector1">
+              <a:avLst/>
+            </a:prstGeom>
+            <a:ln w="28575">
+              <a:solidFill>
+                <a:schemeClr val="accent4"/>
+              </a:solidFill>
+              <a:prstDash val="sysDot"/>
+              <a:tailEnd type="triangle"/>
+            </a:ln>
+          </p:spPr>
+          <p:style>
+            <a:lnRef idx="1">
+              <a:schemeClr val="accent1"/>
+            </a:lnRef>
+            <a:fillRef idx="0">
+              <a:schemeClr val="accent1"/>
+            </a:fillRef>
+            <a:effectRef idx="0">
+              <a:schemeClr val="accent1"/>
+            </a:effectRef>
+            <a:fontRef idx="minor">
+              <a:schemeClr val="tx1"/>
+            </a:fontRef>
+          </p:style>
+        </p:cxnSp>
+        <p:grpSp>
+          <p:nvGrpSpPr>
+            <p:cNvPr id="87" name="Group 86"/>
+            <p:cNvGrpSpPr/>
+            <p:nvPr/>
+          </p:nvGrpSpPr>
+          <p:grpSpPr>
+            <a:xfrm>
+              <a:off x="9277735" y="27952955"/>
+              <a:ext cx="466035" cy="956326"/>
+              <a:chOff x="9277735" y="27952955"/>
+              <a:chExt cx="466035" cy="956326"/>
+            </a:xfrm>
+          </p:grpSpPr>
+          <p:cxnSp>
+            <p:nvCxnSpPr>
+              <p:cNvPr id="55" name="Straight Connector 54"/>
+              <p:cNvCxnSpPr>
+                <a:cxnSpLocks/>
+              </p:cNvCxnSpPr>
+              <p:nvPr/>
+            </p:nvCxnSpPr>
+            <p:spPr>
+              <a:xfrm>
+                <a:off x="9289615" y="27952955"/>
+                <a:ext cx="444067" cy="466035"/>
+              </a:xfrm>
+              <a:prstGeom prst="line">
+                <a:avLst/>
+              </a:prstGeom>
+              <a:ln w="28575">
+                <a:solidFill>
+                  <a:schemeClr val="accent4"/>
+                </a:solidFill>
+                <a:prstDash val="sysDot"/>
+              </a:ln>
+            </p:spPr>
+            <p:style>
+              <a:lnRef idx="1">
+                <a:schemeClr val="accent1"/>
+              </a:lnRef>
+              <a:fillRef idx="0">
+                <a:schemeClr val="accent1"/>
+              </a:fillRef>
+              <a:effectRef idx="0">
+                <a:schemeClr val="accent1"/>
+              </a:effectRef>
+              <a:fontRef idx="minor">
+                <a:schemeClr val="tx1"/>
+              </a:fontRef>
+            </p:style>
+          </p:cxnSp>
+          <p:cxnSp>
+            <p:nvCxnSpPr>
+              <p:cNvPr id="92" name="Straight Connector 91"/>
+              <p:cNvCxnSpPr>
+                <a:cxnSpLocks/>
+              </p:cNvCxnSpPr>
+              <p:nvPr/>
+            </p:nvCxnSpPr>
+            <p:spPr>
+              <a:xfrm rot="16200000">
+                <a:off x="9288719" y="28454230"/>
+                <a:ext cx="444067" cy="466035"/>
+              </a:xfrm>
+              <a:prstGeom prst="line">
+                <a:avLst/>
+              </a:prstGeom>
+              <a:ln w="28575">
+                <a:solidFill>
+                  <a:schemeClr val="accent4"/>
+                </a:solidFill>
+                <a:prstDash val="sysDot"/>
+              </a:ln>
+            </p:spPr>
+            <p:style>
+              <a:lnRef idx="1">
+                <a:schemeClr val="accent1"/>
+              </a:lnRef>
+              <a:fillRef idx="0">
+                <a:schemeClr val="accent1"/>
+              </a:fillRef>
+              <a:effectRef idx="0">
+                <a:schemeClr val="accent1"/>
+              </a:effectRef>
+              <a:fontRef idx="minor">
+                <a:schemeClr val="tx1"/>
+              </a:fontRef>
+            </p:style>
+          </p:cxnSp>
+        </p:grpSp>
+      </p:grpSp>
+      <p:sp>
+        <p:nvSpPr>
+          <p:cNvPr id="97" name="Content Placeholder 21"/>
+          <p:cNvSpPr>
+            <a:spLocks noGrp="1"/>
+          </p:cNvSpPr>
+          <p:nvPr>
+            <p:ph sz="quarter" idx="35"/>
+          </p:nvPr>
+        </p:nvSpPr>
+        <p:spPr>
+          <a:xfrm>
+            <a:off x="30715384" y="22167808"/>
+            <a:ext cx="12755880" cy="5225233"/>
+          </a:xfrm>
+        </p:spPr>
+        <p:txBody>
+          <a:bodyPr/>
+          <a:lstStyle/>
+          <a:p>
+            <a:r>
+              <a:rPr lang="en-US" dirty="0"/>
+              <a:t>Conclusion </a:t>
+            </a:r>
+          </a:p>
+          <a:p>
+            <a:r>
+              <a:rPr lang="en-US" dirty="0"/>
+              <a:t>Conclusion 2</a:t>
+            </a:r>
+          </a:p>
+          <a:p>
+            <a:r>
+              <a:rPr lang="en-US" dirty="0"/>
+              <a:t>Conclusion 3</a:t>
+            </a:r>
+          </a:p>
+        </p:txBody>
+      </p:sp>
       <p:pic>
         <p:nvPicPr>
-          <p:cNvPr id="9" name="Picture 8"/>
+          <p:cNvPr id="90" name="Picture 89"/>
           <p:cNvPicPr>
             <a:picLocks noChangeAspect="1"/>
           </p:cNvPicPr>
           <p:nvPr/>
         </p:nvPicPr>
         <p:blipFill>
-          <a:blip r:embed="rId22"/>
+          <a:blip r:embed="rId21">
+            <a:extLst>
+              <a:ext uri="{28A0092B-C50C-407E-A947-70E740481C1C}">
+                <a14:useLocalDpi xmlns:a14="http://schemas.microsoft.com/office/drawing/2010/main" val="0"/>
+              </a:ext>
+            </a:extLst>
+          </a:blip>
           <a:stretch>
             <a:fillRect/>
           </a:stretch>
         </p:blipFill>
         <p:spPr>
           <a:xfrm>
-            <a:off x="2517143" y="26515994"/>
-            <a:ext cx="8501542" cy="887632"/>
-          </a:xfrm>
-          <a:prstGeom prst="rect">
-            <a:avLst/>
-          </a:prstGeom>
-        </p:spPr>
-      </p:pic>
-      <p:pic>
-        <p:nvPicPr>
-          <p:cNvPr id="13" name="Picture 12"/>
-          <p:cNvPicPr>
-            <a:picLocks noChangeAspect="1"/>
-          </p:cNvPicPr>
-          <p:nvPr/>
-        </p:nvPicPr>
-        <p:blipFill>
-          <a:blip r:embed="rId23"/>
-          <a:stretch>
-            <a:fillRect/>
-          </a:stretch>
-        </p:blipFill>
-        <p:spPr>
-          <a:xfrm>
-            <a:off x="2451370" y="27988138"/>
-            <a:ext cx="8444242" cy="1108974"/>
-          </a:xfrm>
-          <a:prstGeom prst="rect">
-            <a:avLst/>
-          </a:prstGeom>
-        </p:spPr>
-      </p:pic>
-      <p:pic>
-        <p:nvPicPr>
-          <p:cNvPr id="15" name="Picture 14"/>
-          <p:cNvPicPr>
-            <a:picLocks noChangeAspect="1"/>
-          </p:cNvPicPr>
-          <p:nvPr/>
-        </p:nvPicPr>
-        <p:blipFill>
-          <a:blip r:embed="rId24"/>
-          <a:stretch>
-            <a:fillRect/>
-          </a:stretch>
-        </p:blipFill>
-        <p:spPr>
-          <a:xfrm>
-            <a:off x="3034308" y="31504765"/>
-            <a:ext cx="6171429" cy="380952"/>
+            <a:off x="35339988" y="3483592"/>
+            <a:ext cx="8551212" cy="1547074"/>
           </a:xfrm>
           <a:prstGeom prst="rect">
             <a:avLst/>

</xml_diff>

<commit_message>
updated poster and alphapower.R figure plot code
</commit_message>
<xml_diff>
--- a/AAS 2017/Alphapower_Poster.pptx
+++ b/AAS 2017/Alphapower_Poster.pptx
@@ -209,7 +209,7 @@
           <a:p>
             <a:fld id="{F1C0B079-A316-4C9B-B165-DF9EA8325D2C}" type="datetimeFigureOut">
               <a:rPr lang="en-US" smtClean="0"/>
-              <a:t>2/9/2017</a:t>
+              <a:t>2/10/2017</a:t>
             </a:fld>
             <a:endParaRPr lang="en-US" dirty="0"/>
           </a:p>
@@ -374,7 +374,7 @@
           <a:p>
             <a:fld id="{38F28AB8-57D1-494F-9851-055AD867E790}" type="datetimeFigureOut">
               <a:rPr lang="en-US" smtClean="0"/>
-              <a:t>2/9/2017</a:t>
+              <a:t>2/10/2017</a:t>
             </a:fld>
             <a:endParaRPr lang="en-US" dirty="0"/>
           </a:p>
@@ -832,7 +832,7 @@
           <a:p>
             <a:fld id="{ECAA57DF-1C19-4726-AB84-014692BAD8F5}" type="datetimeFigureOut">
               <a:rPr lang="en-US" smtClean="0"/>
-              <a:t>2/9/2017</a:t>
+              <a:t>2/10/2017</a:t>
             </a:fld>
             <a:endParaRPr lang="en-US" dirty="0"/>
           </a:p>
@@ -3486,7 +3486,7 @@
             <a:fld id="{ECAA57DF-1C19-4726-AB84-014692BAD8F5}" type="datetimeFigureOut">
               <a:rPr lang="en-US" smtClean="0"/>
               <a:pPr/>
-              <a:t>2/9/2017</a:t>
+              <a:t>2/10/2017</a:t>
             </a:fld>
             <a:endParaRPr lang="en-US" dirty="0"/>
           </a:p>
@@ -4367,7 +4367,7 @@
         </p:nvSpPr>
         <p:spPr>
           <a:xfrm>
-            <a:off x="16132388" y="7598401"/>
+            <a:off x="16622212" y="7598401"/>
             <a:ext cx="12393099" cy="1828483"/>
           </a:xfrm>
         </p:spPr>
@@ -4381,7 +4381,7 @@
               <a:buNone/>
             </a:pPr>
             <a:r>
-              <a:rPr lang="en-US" sz="4400" dirty="0"/>
+              <a:rPr lang="en-US" sz="4400" b="1" dirty="0"/>
               <a:t>Resting state alpha activity in the eyes open condition varied among hearing aid patients</a:t>
             </a:r>
           </a:p>
@@ -4399,7 +4399,7 @@
         </p:nvSpPr>
         <p:spPr>
           <a:xfrm>
-            <a:off x="30715384" y="20608159"/>
+            <a:off x="30715384" y="24512781"/>
             <a:ext cx="12801600" cy="1219200"/>
           </a:xfrm>
           <a:solidFill>
@@ -4429,12 +4429,14 @@
         </p:nvSpPr>
         <p:spPr>
           <a:xfrm>
-            <a:off x="30521365" y="30195232"/>
-            <a:ext cx="12755880" cy="2166577"/>
+            <a:off x="30521365" y="30940524"/>
+            <a:ext cx="7605139" cy="1291727"/>
           </a:xfrm>
         </p:spPr>
         <p:txBody>
-          <a:bodyPr/>
+          <a:bodyPr>
+            <a:normAutofit fontScale="70000" lnSpcReduction="20000"/>
+          </a:bodyPr>
           <a:lstStyle/>
           <a:p>
             <a:r>
@@ -4575,8 +4577,8 @@
         </p:nvSpPr>
         <p:spPr>
           <a:xfrm>
-            <a:off x="30715384" y="28733496"/>
-            <a:ext cx="12801600" cy="1219200"/>
+            <a:off x="30715384" y="30348137"/>
+            <a:ext cx="4435347" cy="422414"/>
           </a:xfrm>
           <a:solidFill>
             <a:schemeClr val="accent5"/>
@@ -4587,143 +4589,12 @@
           <a:lstStyle/>
           <a:p>
             <a:r>
-              <a:rPr lang="en-US" dirty="0"/>
+              <a:rPr lang="en-US" sz="2800" dirty="0"/>
               <a:t>References</a:t>
             </a:r>
           </a:p>
         </p:txBody>
       </p:sp>
-      <p:pic>
-        <p:nvPicPr>
-          <p:cNvPr id="56" name="Content Placeholder 55"/>
-          <p:cNvPicPr>
-            <a:picLocks noGrp="1" noChangeAspect="1"/>
-          </p:cNvPicPr>
-          <p:nvPr>
-            <p:ph sz="quarter" idx="32"/>
-          </p:nvPr>
-        </p:nvPicPr>
-        <p:blipFill>
-          <a:blip r:embed="rId3">
-            <a:extLst>
-              <a:ext uri="{28A0092B-C50C-407E-A947-70E740481C1C}">
-                <a14:useLocalDpi xmlns:a14="http://schemas.microsoft.com/office/drawing/2010/main" val="0"/>
-              </a:ext>
-            </a:extLst>
-          </a:blip>
-          <a:stretch>
-            <a:fillRect/>
-          </a:stretch>
-        </p:blipFill>
-        <p:spPr>
-          <a:xfrm>
-            <a:off x="30484879" y="9056886"/>
-            <a:ext cx="6316935" cy="4042545"/>
-          </a:xfrm>
-        </p:spPr>
-      </p:pic>
-      <p:pic>
-        <p:nvPicPr>
-          <p:cNvPr id="57" name="Content Placeholder 56"/>
-          <p:cNvPicPr>
-            <a:picLocks noGrp="1" noChangeAspect="1"/>
-          </p:cNvPicPr>
-          <p:nvPr>
-            <p:ph sz="quarter" idx="33"/>
-          </p:nvPr>
-        </p:nvPicPr>
-        <p:blipFill>
-          <a:blip r:embed="rId4">
-            <a:extLst>
-              <a:ext uri="{28A0092B-C50C-407E-A947-70E740481C1C}">
-                <a14:useLocalDpi xmlns:a14="http://schemas.microsoft.com/office/drawing/2010/main" val="0"/>
-              </a:ext>
-            </a:extLst>
-          </a:blip>
-          <a:stretch>
-            <a:fillRect/>
-          </a:stretch>
-        </p:blipFill>
-        <p:spPr>
-          <a:xfrm>
-            <a:off x="30889268" y="14457419"/>
-            <a:ext cx="6762692" cy="4327809"/>
-          </a:xfrm>
-        </p:spPr>
-      </p:pic>
-      <p:grpSp>
-        <p:nvGrpSpPr>
-          <p:cNvPr id="25" name="Group 24"/>
-          <p:cNvGrpSpPr/>
-          <p:nvPr/>
-        </p:nvGrpSpPr>
-        <p:grpSpPr>
-          <a:xfrm>
-            <a:off x="15999267" y="18139838"/>
-            <a:ext cx="14344879" cy="5288659"/>
-            <a:chOff x="15687058" y="19112441"/>
-            <a:chExt cx="14344879" cy="5288659"/>
-          </a:xfrm>
-        </p:grpSpPr>
-        <p:pic>
-          <p:nvPicPr>
-            <p:cNvPr id="29" name="Picture 28"/>
-            <p:cNvPicPr>
-              <a:picLocks noChangeAspect="1"/>
-            </p:cNvPicPr>
-            <p:nvPr/>
-          </p:nvPicPr>
-          <p:blipFill rotWithShape="1">
-            <a:blip r:embed="rId5" cstate="print">
-              <a:extLst>
-                <a:ext uri="{28A0092B-C50C-407E-A947-70E740481C1C}">
-                  <a14:useLocalDpi xmlns:a14="http://schemas.microsoft.com/office/drawing/2010/main" val="0"/>
-                </a:ext>
-              </a:extLst>
-            </a:blip>
-            <a:srcRect t="7426" r="20174"/>
-            <a:stretch/>
-          </p:blipFill>
-          <p:spPr>
-            <a:xfrm>
-              <a:off x="15687058" y="19131063"/>
-              <a:ext cx="6059124" cy="5270037"/>
-            </a:xfrm>
-            <a:prstGeom prst="rect">
-              <a:avLst/>
-            </a:prstGeom>
-          </p:spPr>
-        </p:pic>
-        <p:pic>
-          <p:nvPicPr>
-            <p:cNvPr id="44" name="Picture 43"/>
-            <p:cNvPicPr>
-              <a:picLocks noChangeAspect="1"/>
-            </p:cNvPicPr>
-            <p:nvPr/>
-          </p:nvPicPr>
-          <p:blipFill rotWithShape="1">
-            <a:blip r:embed="rId6" cstate="print">
-              <a:extLst>
-                <a:ext uri="{28A0092B-C50C-407E-A947-70E740481C1C}">
-                  <a14:useLocalDpi xmlns:a14="http://schemas.microsoft.com/office/drawing/2010/main" val="0"/>
-                </a:ext>
-              </a:extLst>
-            </a:blip>
-            <a:srcRect l="10253" t="6511"/>
-            <a:stretch/>
-          </p:blipFill>
-          <p:spPr>
-            <a:xfrm>
-              <a:off x="23299301" y="19112441"/>
-              <a:ext cx="6732636" cy="5260043"/>
-            </a:xfrm>
-            <a:prstGeom prst="rect">
-              <a:avLst/>
-            </a:prstGeom>
-          </p:spPr>
-        </p:pic>
-      </p:grpSp>
       <p:sp>
         <p:nvSpPr>
           <p:cNvPr id="48" name="Content Placeholder 16"/>
@@ -4736,7 +4607,7 @@
         </p:nvSpPr>
         <p:spPr>
           <a:xfrm>
-            <a:off x="18925190" y="9824079"/>
+            <a:off x="18906537" y="9326143"/>
             <a:ext cx="6836229" cy="877346"/>
           </a:xfrm>
         </p:spPr>
@@ -4768,8 +4639,8 @@
         </p:nvSpPr>
         <p:spPr>
           <a:xfrm>
-            <a:off x="18253675" y="16760538"/>
-            <a:ext cx="8663292" cy="1539646"/>
+            <a:off x="18253675" y="15406427"/>
+            <a:ext cx="8663292" cy="879798"/>
           </a:xfrm>
         </p:spPr>
         <p:txBody>
@@ -4808,7 +4679,7 @@
         </p:nvSpPr>
         <p:spPr>
           <a:xfrm>
-            <a:off x="15083739" y="23952530"/>
+            <a:off x="14987018" y="24330060"/>
             <a:ext cx="15437626" cy="951725"/>
           </a:xfrm>
         </p:spPr>
@@ -4840,13 +4711,13 @@
         </p:nvSpPr>
         <p:spPr>
           <a:xfrm>
-            <a:off x="16878596" y="29642220"/>
-            <a:ext cx="11413450" cy="2971380"/>
+            <a:off x="17112037" y="31260334"/>
+            <a:ext cx="11413450" cy="1658066"/>
           </a:xfrm>
         </p:spPr>
         <p:txBody>
           <a:bodyPr>
-            <a:normAutofit/>
+            <a:normAutofit lnSpcReduction="10000"/>
           </a:bodyPr>
           <a:lstStyle/>
           <a:p>
@@ -4854,7 +4725,7 @@
               <a:buNone/>
             </a:pPr>
             <a:r>
-              <a:rPr lang="en-US" dirty="0"/>
+              <a:rPr lang="en-US" sz="2400" dirty="0"/>
               <a:t>Figure 2. Individual subject differences in time frequency data during the eyes open condition.  Notice in the top row (subject 1) the increased activation in the alpha band (7.5-12.5Hz), while the bottom row (subject 2) shows no activation across different frequency bands.</a:t>
             </a:r>
           </a:p>
@@ -4872,13 +4743,13 @@
         </p:nvSpPr>
         <p:spPr>
           <a:xfrm>
-            <a:off x="30742327" y="7409464"/>
-            <a:ext cx="12393099" cy="1307968"/>
+            <a:off x="30715384" y="13040487"/>
+            <a:ext cx="12393099" cy="1438827"/>
           </a:xfrm>
         </p:spPr>
         <p:txBody>
           <a:bodyPr>
-            <a:normAutofit fontScale="92500" lnSpcReduction="20000"/>
+            <a:normAutofit fontScale="92500" lnSpcReduction="10000"/>
           </a:bodyPr>
           <a:lstStyle/>
           <a:p>
@@ -4886,42 +4757,12 @@
               <a:buNone/>
             </a:pPr>
             <a:r>
-              <a:rPr lang="en-US" sz="4800" dirty="0"/>
+              <a:rPr lang="en-US" sz="4800" b="1" dirty="0"/>
               <a:t>Decreased SNR thresholds were associated with increased alpha power</a:t>
             </a:r>
           </a:p>
         </p:txBody>
       </p:sp>
-      <p:pic>
-        <p:nvPicPr>
-          <p:cNvPr id="61" name="Picture 60"/>
-          <p:cNvPicPr>
-            <a:picLocks noChangeAspect="1"/>
-          </p:cNvPicPr>
-          <p:nvPr/>
-        </p:nvPicPr>
-        <p:blipFill>
-          <a:blip r:embed="rId7">
-            <a:extLst>
-              <a:ext uri="{28A0092B-C50C-407E-A947-70E740481C1C}">
-                <a14:useLocalDpi xmlns:a14="http://schemas.microsoft.com/office/drawing/2010/main" val="0"/>
-              </a:ext>
-            </a:extLst>
-          </a:blip>
-          <a:stretch>
-            <a:fillRect/>
-          </a:stretch>
-        </p:blipFill>
-        <p:spPr>
-          <a:xfrm>
-            <a:off x="37042252" y="8959968"/>
-            <a:ext cx="6474732" cy="4143528"/>
-          </a:xfrm>
-          <a:prstGeom prst="rect">
-            <a:avLst/>
-          </a:prstGeom>
-        </p:spPr>
-      </p:pic>
       <p:sp>
         <p:nvSpPr>
           <p:cNvPr id="62" name="Content Placeholder 16"/>
@@ -4934,7 +4775,7 @@
         </p:nvSpPr>
         <p:spPr>
           <a:xfrm>
-            <a:off x="30443385" y="18785228"/>
+            <a:off x="30443385" y="23260715"/>
             <a:ext cx="12747714" cy="1167080"/>
           </a:xfrm>
         </p:spPr>
@@ -4949,7 +4790,7 @@
             </a:pPr>
             <a:r>
               <a:rPr lang="en-US" sz="2200" dirty="0"/>
-              <a:t>Figure 4.  Significant correlations between SNR thresholds and pure tone average thresholds were observed</a:t>
+              <a:t>Figure 4.  </a:t>
             </a:r>
           </a:p>
         </p:txBody>
@@ -4966,13 +4807,13 @@
         </p:nvSpPr>
         <p:spPr>
           <a:xfrm>
-            <a:off x="30465884" y="13280096"/>
+            <a:off x="30443385" y="18286475"/>
             <a:ext cx="12747714" cy="1167080"/>
           </a:xfrm>
         </p:spPr>
         <p:txBody>
           <a:bodyPr>
-            <a:normAutofit/>
+            <a:normAutofit lnSpcReduction="10000"/>
           </a:bodyPr>
           <a:lstStyle/>
           <a:p>
@@ -4981,7 +4822,7 @@
             </a:pPr>
             <a:r>
               <a:rPr lang="en-US" sz="2200" dirty="0"/>
-              <a:t>Figure 3.  Significant correlations between SNR thresholds and alpha band power were observed</a:t>
+              <a:t>Figure 3.  Significant correlations between SNR thresholds and alpha power during the eyes open condition.  Alpha power was calculated as area under the curve from the FFT power spectrum in the alpha frequency band.  </a:t>
             </a:r>
           </a:p>
         </p:txBody>
@@ -5023,7 +4864,7 @@
               <p:nvPr/>
             </p:nvPicPr>
             <p:blipFill>
-              <a:blip r:embed="rId8"/>
+              <a:blip r:embed="rId3"/>
               <a:stretch>
                 <a:fillRect/>
               </a:stretch>
@@ -5047,7 +4888,7 @@
               <p:nvPr/>
             </p:nvPicPr>
             <p:blipFill>
-              <a:blip r:embed="rId9"/>
+              <a:blip r:embed="rId4"/>
               <a:stretch>
                 <a:fillRect/>
               </a:stretch>
@@ -5086,7 +4927,7 @@
               <p:nvPr/>
             </p:nvPicPr>
             <p:blipFill>
-              <a:blip r:embed="rId10"/>
+              <a:blip r:embed="rId5"/>
               <a:stretch>
                 <a:fillRect/>
               </a:stretch>
@@ -5110,7 +4951,7 @@
               <p:nvPr/>
             </p:nvPicPr>
             <p:blipFill>
-              <a:blip r:embed="rId11"/>
+              <a:blip r:embed="rId6"/>
               <a:stretch>
                 <a:fillRect/>
               </a:stretch>
@@ -5149,7 +4990,7 @@
               <p:nvPr/>
             </p:nvPicPr>
             <p:blipFill>
-              <a:blip r:embed="rId12"/>
+              <a:blip r:embed="rId7"/>
               <a:stretch>
                 <a:fillRect/>
               </a:stretch>
@@ -5173,7 +5014,7 @@
               <p:nvPr/>
             </p:nvPicPr>
             <p:blipFill>
-              <a:blip r:embed="rId13"/>
+              <a:blip r:embed="rId8"/>
               <a:stretch>
                 <a:fillRect/>
               </a:stretch>
@@ -5231,7 +5072,7 @@
           <p:nvPr/>
         </p:nvPicPr>
         <p:blipFill rotWithShape="1">
-          <a:blip r:embed="rId14">
+          <a:blip r:embed="rId9">
             <a:extLst>
               <a:ext uri="{28A0092B-C50C-407E-A947-70E740481C1C}">
                 <a14:useLocalDpi xmlns:a14="http://schemas.microsoft.com/office/drawing/2010/main" val="0"/>
@@ -5278,141 +5119,6 @@
           </a:p>
         </p:txBody>
       </p:sp>
-      <p:grpSp>
-        <p:nvGrpSpPr>
-          <p:cNvPr id="26" name="Group 25"/>
-          <p:cNvGrpSpPr/>
-          <p:nvPr/>
-        </p:nvGrpSpPr>
-        <p:grpSpPr>
-          <a:xfrm>
-            <a:off x="15371614" y="11136950"/>
-            <a:ext cx="14466702" cy="5248123"/>
-            <a:chOff x="15269028" y="12697030"/>
-            <a:chExt cx="14466702" cy="5248123"/>
-          </a:xfrm>
-        </p:grpSpPr>
-        <p:pic>
-          <p:nvPicPr>
-            <p:cNvPr id="2" name="Picture 1"/>
-            <p:cNvPicPr>
-              <a:picLocks noChangeAspect="1"/>
-            </p:cNvPicPr>
-            <p:nvPr/>
-          </p:nvPicPr>
-          <p:blipFill rotWithShape="1">
-            <a:blip r:embed="rId15">
-              <a:extLst>
-                <a:ext uri="{28A0092B-C50C-407E-A947-70E740481C1C}">
-                  <a14:useLocalDpi xmlns:a14="http://schemas.microsoft.com/office/drawing/2010/main" val="0"/>
-                </a:ext>
-              </a:extLst>
-            </a:blip>
-            <a:srcRect l="1088" t="6557"/>
-            <a:stretch/>
-          </p:blipFill>
-          <p:spPr>
-            <a:xfrm>
-              <a:off x="15269028" y="12697030"/>
-              <a:ext cx="7415247" cy="5241444"/>
-            </a:xfrm>
-            <a:prstGeom prst="rect">
-              <a:avLst/>
-            </a:prstGeom>
-          </p:spPr>
-        </p:pic>
-        <p:pic>
-          <p:nvPicPr>
-            <p:cNvPr id="5" name="Picture 4"/>
-            <p:cNvPicPr>
-              <a:picLocks noChangeAspect="1"/>
-            </p:cNvPicPr>
-            <p:nvPr/>
-          </p:nvPicPr>
-          <p:blipFill rotWithShape="1">
-            <a:blip r:embed="rId16">
-              <a:extLst>
-                <a:ext uri="{28A0092B-C50C-407E-A947-70E740481C1C}">
-                  <a14:useLocalDpi xmlns:a14="http://schemas.microsoft.com/office/drawing/2010/main" val="0"/>
-                </a:ext>
-              </a:extLst>
-            </a:blip>
-            <a:srcRect l="12494" t="7049"/>
-            <a:stretch/>
-          </p:blipFill>
-          <p:spPr>
-            <a:xfrm>
-              <a:off x="23225846" y="12758895"/>
-              <a:ext cx="6509884" cy="5186258"/>
-            </a:xfrm>
-            <a:prstGeom prst="rect">
-              <a:avLst/>
-            </a:prstGeom>
-          </p:spPr>
-        </p:pic>
-      </p:grpSp>
-      <p:grpSp>
-        <p:nvGrpSpPr>
-          <p:cNvPr id="32" name="Group 31"/>
-          <p:cNvGrpSpPr/>
-          <p:nvPr/>
-        </p:nvGrpSpPr>
-        <p:grpSpPr>
-          <a:xfrm>
-            <a:off x="17051190" y="25087992"/>
-            <a:ext cx="11068262" cy="4352925"/>
-            <a:chOff x="16944031" y="25811674"/>
-            <a:chExt cx="11068262" cy="4352925"/>
-          </a:xfrm>
-        </p:grpSpPr>
-        <p:pic>
-          <p:nvPicPr>
-            <p:cNvPr id="19" name="Picture 18"/>
-            <p:cNvPicPr>
-              <a:picLocks noChangeAspect="1"/>
-            </p:cNvPicPr>
-            <p:nvPr/>
-          </p:nvPicPr>
-          <p:blipFill rotWithShape="1">
-            <a:blip r:embed="rId17"/>
-            <a:srcRect r="11385"/>
-            <a:stretch/>
-          </p:blipFill>
-          <p:spPr>
-            <a:xfrm>
-              <a:off x="23725399" y="26068848"/>
-              <a:ext cx="4286894" cy="4095751"/>
-            </a:xfrm>
-            <a:prstGeom prst="rect">
-              <a:avLst/>
-            </a:prstGeom>
-          </p:spPr>
-        </p:pic>
-        <p:pic>
-          <p:nvPicPr>
-            <p:cNvPr id="24" name="Picture 23"/>
-            <p:cNvPicPr>
-              <a:picLocks noChangeAspect="1"/>
-            </p:cNvPicPr>
-            <p:nvPr/>
-          </p:nvPicPr>
-          <p:blipFill>
-            <a:blip r:embed="rId18"/>
-            <a:stretch>
-              <a:fillRect/>
-            </a:stretch>
-          </p:blipFill>
-          <p:spPr>
-            <a:xfrm>
-              <a:off x="16944031" y="25811674"/>
-              <a:ext cx="4562475" cy="4352925"/>
-            </a:xfrm>
-            <a:prstGeom prst="rect">
-              <a:avLst/>
-            </a:prstGeom>
-          </p:spPr>
-        </p:pic>
-      </p:grpSp>
       <p:pic>
         <p:nvPicPr>
           <p:cNvPr id="37" name="Picture 36"/>
@@ -5422,7 +5128,7 @@
           <p:nvPr/>
         </p:nvPicPr>
         <p:blipFill>
-          <a:blip r:embed="rId19" cstate="print">
+          <a:blip r:embed="rId10" cstate="print">
             <a:extLst>
               <a:ext uri="{28A0092B-C50C-407E-A947-70E740481C1C}">
                 <a14:useLocalDpi xmlns:a14="http://schemas.microsoft.com/office/drawing/2010/main" val="0"/>
@@ -5452,7 +5158,7 @@
           <p:nvPr/>
         </p:nvPicPr>
         <p:blipFill>
-          <a:blip r:embed="rId20" cstate="print">
+          <a:blip r:embed="rId11" cstate="print">
             <a:extLst>
               <a:ext uri="{28A0092B-C50C-407E-A947-70E740481C1C}">
                 <a14:useLocalDpi xmlns:a14="http://schemas.microsoft.com/office/drawing/2010/main" val="0"/>
@@ -5803,8 +5509,8 @@
         </p:nvSpPr>
         <p:spPr>
           <a:xfrm>
-            <a:off x="30715384" y="22167808"/>
-            <a:ext cx="12755880" cy="5225233"/>
+            <a:off x="30715384" y="25840906"/>
+            <a:ext cx="12755880" cy="4317468"/>
           </a:xfrm>
         </p:spPr>
         <p:txBody>
@@ -5813,19 +5519,37 @@
           <a:p>
             <a:r>
               <a:rPr lang="en-US" dirty="0"/>
-              <a:t>Conclusion </a:t>
-            </a:r>
-          </a:p>
-          <a:p>
-            <a:r>
-              <a:rPr lang="en-US" dirty="0"/>
-              <a:t>Conclusion 2</a:t>
-            </a:r>
-          </a:p>
-          <a:p>
-            <a:r>
-              <a:rPr lang="en-US" dirty="0"/>
-              <a:t>Conclusion 3</a:t>
+              <a:t>Alpha power was primarily concentrated to occipital electrodes </a:t>
+            </a:r>
+          </a:p>
+          <a:p>
+            <a:r>
+              <a:rPr lang="en-US" dirty="0"/>
+              <a:t>Subject variability in alpha power was recorded</a:t>
+            </a:r>
+          </a:p>
+          <a:p>
+            <a:r>
+              <a:rPr lang="en-US" dirty="0"/>
+              <a:t>Alpha power was greater in the eyes closed condition compared to eyes open</a:t>
+            </a:r>
+          </a:p>
+          <a:p>
+            <a:r>
+              <a:rPr lang="en-US" dirty="0"/>
+              <a:t>SNR-50 thresholds decreased as a function of alpha power during the eyes open condition, and increased during eyes closed</a:t>
+            </a:r>
+          </a:p>
+          <a:p>
+            <a:r>
+              <a:rPr lang="en-US" dirty="0"/>
+              <a:t>Audibility and age did not significantly contribute to SNR-50 thresholds </a:t>
+            </a:r>
+          </a:p>
+          <a:p>
+            <a:r>
+              <a:rPr lang="en-US" dirty="0"/>
+              <a:t>EEG alpha power may be predictive of SNR-50 threshold outcome measures</a:t>
             </a:r>
           </a:p>
         </p:txBody>
@@ -5839,7 +5563,7 @@
           <p:nvPr/>
         </p:nvPicPr>
         <p:blipFill>
-          <a:blip r:embed="rId21">
+          <a:blip r:embed="rId12">
             <a:extLst>
               <a:ext uri="{28A0092B-C50C-407E-A947-70E740481C1C}">
                 <a14:useLocalDpi xmlns:a14="http://schemas.microsoft.com/office/drawing/2010/main" val="0"/>
@@ -5860,6 +5584,900 @@
           </a:prstGeom>
         </p:spPr>
       </p:pic>
+      <p:grpSp>
+        <p:nvGrpSpPr>
+          <p:cNvPr id="29" name="Group 28"/>
+          <p:cNvGrpSpPr/>
+          <p:nvPr/>
+        </p:nvGrpSpPr>
+        <p:grpSpPr>
+          <a:xfrm>
+            <a:off x="30646528" y="19738484"/>
+            <a:ext cx="11745229" cy="3624181"/>
+            <a:chOff x="30646528" y="15509620"/>
+            <a:chExt cx="12870456" cy="3971388"/>
+          </a:xfrm>
+        </p:grpSpPr>
+        <p:pic>
+          <p:nvPicPr>
+            <p:cNvPr id="13" name="Picture 12"/>
+            <p:cNvPicPr>
+              <a:picLocks noChangeAspect="1"/>
+            </p:cNvPicPr>
+            <p:nvPr/>
+          </p:nvPicPr>
+          <p:blipFill rotWithShape="1">
+            <a:blip r:embed="rId13">
+              <a:extLst>
+                <a:ext uri="{28A0092B-C50C-407E-A947-70E740481C1C}">
+                  <a14:useLocalDpi xmlns:a14="http://schemas.microsoft.com/office/drawing/2010/main" val="0"/>
+                </a:ext>
+              </a:extLst>
+            </a:blip>
+            <a:srcRect l="5167"/>
+            <a:stretch/>
+          </p:blipFill>
+          <p:spPr>
+            <a:xfrm>
+              <a:off x="37621180" y="15509620"/>
+              <a:ext cx="5895804" cy="3971388"/>
+            </a:xfrm>
+            <a:prstGeom prst="rect">
+              <a:avLst/>
+            </a:prstGeom>
+          </p:spPr>
+        </p:pic>
+        <p:pic>
+          <p:nvPicPr>
+            <p:cNvPr id="16" name="Picture 15"/>
+            <p:cNvPicPr>
+              <a:picLocks noChangeAspect="1"/>
+            </p:cNvPicPr>
+            <p:nvPr/>
+          </p:nvPicPr>
+          <p:blipFill>
+            <a:blip r:embed="rId14">
+              <a:extLst>
+                <a:ext uri="{28A0092B-C50C-407E-A947-70E740481C1C}">
+                  <a14:useLocalDpi xmlns:a14="http://schemas.microsoft.com/office/drawing/2010/main" val="0"/>
+                </a:ext>
+              </a:extLst>
+            </a:blip>
+            <a:stretch>
+              <a:fillRect/>
+            </a:stretch>
+          </p:blipFill>
+          <p:spPr>
+            <a:xfrm>
+              <a:off x="30646528" y="15666502"/>
+              <a:ext cx="5779627" cy="3691980"/>
+            </a:xfrm>
+            <a:prstGeom prst="rect">
+              <a:avLst/>
+            </a:prstGeom>
+          </p:spPr>
+        </p:pic>
+      </p:grpSp>
+      <p:pic>
+        <p:nvPicPr>
+          <p:cNvPr id="59" name="Picture 58"/>
+          <p:cNvPicPr>
+            <a:picLocks noChangeAspect="1"/>
+          </p:cNvPicPr>
+          <p:nvPr/>
+        </p:nvPicPr>
+        <p:blipFill>
+          <a:blip r:embed="rId15"/>
+          <a:stretch>
+            <a:fillRect/>
+          </a:stretch>
+        </p:blipFill>
+        <p:spPr>
+          <a:xfrm>
+            <a:off x="28183788" y="18067369"/>
+            <a:ext cx="742857" cy="4342857"/>
+          </a:xfrm>
+          <a:prstGeom prst="rect">
+            <a:avLst/>
+          </a:prstGeom>
+        </p:spPr>
+      </p:pic>
+      <p:grpSp>
+        <p:nvGrpSpPr>
+          <p:cNvPr id="94" name="Group 93"/>
+          <p:cNvGrpSpPr/>
+          <p:nvPr/>
+        </p:nvGrpSpPr>
+        <p:grpSpPr>
+          <a:xfrm>
+            <a:off x="17599955" y="16286225"/>
+            <a:ext cx="10551281" cy="8015462"/>
+            <a:chOff x="17599955" y="16600186"/>
+            <a:chExt cx="10551281" cy="8015462"/>
+          </a:xfrm>
+        </p:grpSpPr>
+        <p:pic>
+          <p:nvPicPr>
+            <p:cNvPr id="83" name="Picture 82"/>
+            <p:cNvPicPr preferRelativeResize="0">
+              <a:picLocks/>
+            </p:cNvPicPr>
+            <p:nvPr/>
+          </p:nvPicPr>
+          <p:blipFill>
+            <a:blip r:embed="rId16">
+              <a:extLst>
+                <a:ext uri="{28A0092B-C50C-407E-A947-70E740481C1C}">
+                  <a14:useLocalDpi xmlns:a14="http://schemas.microsoft.com/office/drawing/2010/main" val="0"/>
+                </a:ext>
+              </a:extLst>
+            </a:blip>
+            <a:stretch>
+              <a:fillRect/>
+            </a:stretch>
+          </p:blipFill>
+          <p:spPr>
+            <a:xfrm>
+              <a:off x="17599955" y="20610576"/>
+              <a:ext cx="4901184" cy="4005072"/>
+            </a:xfrm>
+            <a:prstGeom prst="rect">
+              <a:avLst/>
+            </a:prstGeom>
+          </p:spPr>
+        </p:pic>
+        <p:pic>
+          <p:nvPicPr>
+            <p:cNvPr id="86" name="Picture 85"/>
+            <p:cNvPicPr preferRelativeResize="0">
+              <a:picLocks/>
+            </p:cNvPicPr>
+            <p:nvPr/>
+          </p:nvPicPr>
+          <p:blipFill>
+            <a:blip r:embed="rId17">
+              <a:extLst>
+                <a:ext uri="{28A0092B-C50C-407E-A947-70E740481C1C}">
+                  <a14:useLocalDpi xmlns:a14="http://schemas.microsoft.com/office/drawing/2010/main" val="0"/>
+                </a:ext>
+              </a:extLst>
+            </a:blip>
+            <a:stretch>
+              <a:fillRect/>
+            </a:stretch>
+          </p:blipFill>
+          <p:spPr>
+            <a:xfrm>
+              <a:off x="23041841" y="20610014"/>
+              <a:ext cx="4901184" cy="4000500"/>
+            </a:xfrm>
+            <a:prstGeom prst="rect">
+              <a:avLst/>
+            </a:prstGeom>
+          </p:spPr>
+        </p:pic>
+        <p:pic>
+          <p:nvPicPr>
+            <p:cNvPr id="89" name="Picture 88"/>
+            <p:cNvPicPr preferRelativeResize="0">
+              <a:picLocks/>
+            </p:cNvPicPr>
+            <p:nvPr/>
+          </p:nvPicPr>
+          <p:blipFill>
+            <a:blip r:embed="rId18">
+              <a:extLst>
+                <a:ext uri="{28A0092B-C50C-407E-A947-70E740481C1C}">
+                  <a14:useLocalDpi xmlns:a14="http://schemas.microsoft.com/office/drawing/2010/main" val="0"/>
+                </a:ext>
+              </a:extLst>
+            </a:blip>
+            <a:stretch>
+              <a:fillRect/>
+            </a:stretch>
+          </p:blipFill>
+          <p:spPr>
+            <a:xfrm>
+              <a:off x="23254073" y="16600186"/>
+              <a:ext cx="4897163" cy="4000500"/>
+            </a:xfrm>
+            <a:prstGeom prst="rect">
+              <a:avLst/>
+            </a:prstGeom>
+          </p:spPr>
+        </p:pic>
+        <p:pic>
+          <p:nvPicPr>
+            <p:cNvPr id="91" name="Picture 90"/>
+            <p:cNvPicPr>
+              <a:picLocks noChangeAspect="1"/>
+            </p:cNvPicPr>
+            <p:nvPr/>
+          </p:nvPicPr>
+          <p:blipFill>
+            <a:blip r:embed="rId19">
+              <a:extLst>
+                <a:ext uri="{28A0092B-C50C-407E-A947-70E740481C1C}">
+                  <a14:useLocalDpi xmlns:a14="http://schemas.microsoft.com/office/drawing/2010/main" val="0"/>
+                </a:ext>
+              </a:extLst>
+            </a:blip>
+            <a:stretch>
+              <a:fillRect/>
+            </a:stretch>
+          </p:blipFill>
+          <p:spPr>
+            <a:xfrm>
+              <a:off x="17818373" y="16600186"/>
+              <a:ext cx="4897163" cy="4000500"/>
+            </a:xfrm>
+            <a:prstGeom prst="rect">
+              <a:avLst/>
+            </a:prstGeom>
+          </p:spPr>
+        </p:pic>
+      </p:grpSp>
+      <p:pic>
+        <p:nvPicPr>
+          <p:cNvPr id="105" name="Picture 104"/>
+          <p:cNvPicPr preferRelativeResize="0">
+            <a:picLocks/>
+          </p:cNvPicPr>
+          <p:nvPr/>
+        </p:nvPicPr>
+        <p:blipFill>
+          <a:blip r:embed="rId20"/>
+          <a:stretch>
+            <a:fillRect/>
+          </a:stretch>
+        </p:blipFill>
+        <p:spPr>
+          <a:xfrm>
+            <a:off x="28181810" y="26351614"/>
+            <a:ext cx="740664" cy="4343400"/>
+          </a:xfrm>
+          <a:prstGeom prst="rect">
+            <a:avLst/>
+          </a:prstGeom>
+        </p:spPr>
+      </p:pic>
+      <p:grpSp>
+        <p:nvGrpSpPr>
+          <p:cNvPr id="109" name="Group 108"/>
+          <p:cNvGrpSpPr/>
+          <p:nvPr/>
+        </p:nvGrpSpPr>
+        <p:grpSpPr>
+          <a:xfrm>
+            <a:off x="18767921" y="25429464"/>
+            <a:ext cx="8304825" cy="5978584"/>
+            <a:chOff x="18767921" y="25429464"/>
+            <a:chExt cx="8304825" cy="5978584"/>
+          </a:xfrm>
+        </p:grpSpPr>
+        <p:pic>
+          <p:nvPicPr>
+            <p:cNvPr id="99" name="Picture 98"/>
+            <p:cNvPicPr>
+              <a:picLocks noChangeAspect="1"/>
+            </p:cNvPicPr>
+            <p:nvPr/>
+          </p:nvPicPr>
+          <p:blipFill>
+            <a:blip r:embed="rId21">
+              <a:extLst>
+                <a:ext uri="{28A0092B-C50C-407E-A947-70E740481C1C}">
+                  <a14:useLocalDpi xmlns:a14="http://schemas.microsoft.com/office/drawing/2010/main" val="0"/>
+                </a:ext>
+              </a:extLst>
+            </a:blip>
+            <a:stretch>
+              <a:fillRect/>
+            </a:stretch>
+          </p:blipFill>
+          <p:spPr>
+            <a:xfrm>
+              <a:off x="23807694" y="25429464"/>
+              <a:ext cx="3261770" cy="2961064"/>
+            </a:xfrm>
+            <a:prstGeom prst="rect">
+              <a:avLst/>
+            </a:prstGeom>
+          </p:spPr>
+        </p:pic>
+        <p:pic>
+          <p:nvPicPr>
+            <p:cNvPr id="101" name="Picture 100"/>
+            <p:cNvPicPr>
+              <a:picLocks noChangeAspect="1"/>
+            </p:cNvPicPr>
+            <p:nvPr/>
+          </p:nvPicPr>
+          <p:blipFill>
+            <a:blip r:embed="rId22">
+              <a:extLst>
+                <a:ext uri="{28A0092B-C50C-407E-A947-70E740481C1C}">
+                  <a14:useLocalDpi xmlns:a14="http://schemas.microsoft.com/office/drawing/2010/main" val="0"/>
+                </a:ext>
+              </a:extLst>
+            </a:blip>
+            <a:stretch>
+              <a:fillRect/>
+            </a:stretch>
+          </p:blipFill>
+          <p:spPr>
+            <a:xfrm>
+              <a:off x="18772632" y="28445182"/>
+              <a:ext cx="3261770" cy="2961064"/>
+            </a:xfrm>
+            <a:prstGeom prst="rect">
+              <a:avLst/>
+            </a:prstGeom>
+          </p:spPr>
+        </p:pic>
+        <p:pic>
+          <p:nvPicPr>
+            <p:cNvPr id="103" name="Picture 102"/>
+            <p:cNvPicPr>
+              <a:picLocks noChangeAspect="1"/>
+            </p:cNvPicPr>
+            <p:nvPr/>
+          </p:nvPicPr>
+          <p:blipFill>
+            <a:blip r:embed="rId23">
+              <a:extLst>
+                <a:ext uri="{28A0092B-C50C-407E-A947-70E740481C1C}">
+                  <a14:useLocalDpi xmlns:a14="http://schemas.microsoft.com/office/drawing/2010/main" val="0"/>
+                </a:ext>
+              </a:extLst>
+            </a:blip>
+            <a:stretch>
+              <a:fillRect/>
+            </a:stretch>
+          </p:blipFill>
+          <p:spPr>
+            <a:xfrm>
+              <a:off x="23810976" y="28446984"/>
+              <a:ext cx="3261770" cy="2961064"/>
+            </a:xfrm>
+            <a:prstGeom prst="rect">
+              <a:avLst/>
+            </a:prstGeom>
+          </p:spPr>
+        </p:pic>
+        <p:pic>
+          <p:nvPicPr>
+            <p:cNvPr id="107" name="Picture 106"/>
+            <p:cNvPicPr preferRelativeResize="0">
+              <a:picLocks/>
+            </p:cNvPicPr>
+            <p:nvPr/>
+          </p:nvPicPr>
+          <p:blipFill>
+            <a:blip r:embed="rId24">
+              <a:extLst>
+                <a:ext uri="{28A0092B-C50C-407E-A947-70E740481C1C}">
+                  <a14:useLocalDpi xmlns:a14="http://schemas.microsoft.com/office/drawing/2010/main" val="0"/>
+                </a:ext>
+              </a:extLst>
+            </a:blip>
+            <a:stretch>
+              <a:fillRect/>
+            </a:stretch>
+          </p:blipFill>
+          <p:spPr>
+            <a:xfrm>
+              <a:off x="18767921" y="25431472"/>
+              <a:ext cx="3264408" cy="2964448"/>
+            </a:xfrm>
+            <a:prstGeom prst="rect">
+              <a:avLst/>
+            </a:prstGeom>
+          </p:spPr>
+        </p:pic>
+      </p:grpSp>
+      <p:pic>
+        <p:nvPicPr>
+          <p:cNvPr id="17" name="Picture 16"/>
+          <p:cNvPicPr>
+            <a:picLocks noChangeAspect="1"/>
+          </p:cNvPicPr>
+          <p:nvPr/>
+        </p:nvPicPr>
+        <p:blipFill>
+          <a:blip r:embed="rId25">
+            <a:extLst>
+              <a:ext uri="{28A0092B-C50C-407E-A947-70E740481C1C}">
+                <a14:useLocalDpi xmlns:a14="http://schemas.microsoft.com/office/drawing/2010/main" val="0"/>
+              </a:ext>
+            </a:extLst>
+          </a:blip>
+          <a:stretch>
+            <a:fillRect/>
+          </a:stretch>
+        </p:blipFill>
+        <p:spPr>
+          <a:xfrm>
+            <a:off x="16161122" y="9985120"/>
+            <a:ext cx="6762750" cy="5524500"/>
+          </a:xfrm>
+          <a:prstGeom prst="rect">
+            <a:avLst/>
+          </a:prstGeom>
+        </p:spPr>
+      </p:pic>
+      <p:pic>
+        <p:nvPicPr>
+          <p:cNvPr id="24" name="Picture 23"/>
+          <p:cNvPicPr>
+            <a:picLocks noChangeAspect="1"/>
+          </p:cNvPicPr>
+          <p:nvPr/>
+        </p:nvPicPr>
+        <p:blipFill>
+          <a:blip r:embed="rId26">
+            <a:extLst>
+              <a:ext uri="{28A0092B-C50C-407E-A947-70E740481C1C}">
+                <a14:useLocalDpi xmlns:a14="http://schemas.microsoft.com/office/drawing/2010/main" val="0"/>
+              </a:ext>
+            </a:extLst>
+          </a:blip>
+          <a:stretch>
+            <a:fillRect/>
+          </a:stretch>
+        </p:blipFill>
+        <p:spPr>
+          <a:xfrm>
+            <a:off x="22380044" y="9949654"/>
+            <a:ext cx="6762750" cy="5524500"/>
+          </a:xfrm>
+          <a:prstGeom prst="rect">
+            <a:avLst/>
+          </a:prstGeom>
+        </p:spPr>
+      </p:pic>
+      <p:pic>
+        <p:nvPicPr>
+          <p:cNvPr id="25" name="Picture 24"/>
+          <p:cNvPicPr>
+            <a:picLocks noChangeAspect="1"/>
+          </p:cNvPicPr>
+          <p:nvPr/>
+        </p:nvPicPr>
+        <p:blipFill>
+          <a:blip r:embed="rId27">
+            <a:extLst>
+              <a:ext uri="{28A0092B-C50C-407E-A947-70E740481C1C}">
+                <a14:useLocalDpi xmlns:a14="http://schemas.microsoft.com/office/drawing/2010/main" val="0"/>
+              </a:ext>
+            </a:extLst>
+          </a:blip>
+          <a:stretch>
+            <a:fillRect/>
+          </a:stretch>
+        </p:blipFill>
+        <p:spPr>
+          <a:xfrm>
+            <a:off x="37361727" y="14855648"/>
+            <a:ext cx="5317073" cy="3396504"/>
+          </a:xfrm>
+          <a:prstGeom prst="rect">
+            <a:avLst/>
+          </a:prstGeom>
+        </p:spPr>
+      </p:pic>
+      <p:pic>
+        <p:nvPicPr>
+          <p:cNvPr id="27" name="Picture 26"/>
+          <p:cNvPicPr>
+            <a:picLocks noChangeAspect="1"/>
+          </p:cNvPicPr>
+          <p:nvPr/>
+        </p:nvPicPr>
+        <p:blipFill>
+          <a:blip r:embed="rId28">
+            <a:extLst>
+              <a:ext uri="{28A0092B-C50C-407E-A947-70E740481C1C}">
+                <a14:useLocalDpi xmlns:a14="http://schemas.microsoft.com/office/drawing/2010/main" val="0"/>
+              </a:ext>
+            </a:extLst>
+          </a:blip>
+          <a:stretch>
+            <a:fillRect/>
+          </a:stretch>
+        </p:blipFill>
+        <p:spPr>
+          <a:xfrm>
+            <a:off x="30443385" y="14739531"/>
+            <a:ext cx="5408222" cy="3454729"/>
+          </a:xfrm>
+          <a:prstGeom prst="rect">
+            <a:avLst/>
+          </a:prstGeom>
+        </p:spPr>
+      </p:pic>
+      <p:graphicFrame>
+        <p:nvGraphicFramePr>
+          <p:cNvPr id="32" name="Table 31"/>
+          <p:cNvGraphicFramePr>
+            <a:graphicFrameLocks noGrp="1"/>
+          </p:cNvGraphicFramePr>
+          <p:nvPr>
+            <p:extLst>
+              <p:ext uri="{D42A27DB-BD31-4B8C-83A1-F6EECF244321}">
+                <p14:modId xmlns:p14="http://schemas.microsoft.com/office/powerpoint/2010/main" val="1651639643"/>
+              </p:ext>
+            </p:extLst>
+          </p:nvPr>
+        </p:nvGraphicFramePr>
+        <p:xfrm>
+          <a:off x="30774964" y="8573494"/>
+          <a:ext cx="12696300" cy="3573594"/>
+        </p:xfrm>
+        <a:graphic>
+          <a:graphicData uri="http://schemas.openxmlformats.org/drawingml/2006/table">
+            <a:tbl>
+              <a:tblPr firstRow="1" bandRow="1">
+                <a:tableStyleId>{5940675A-B579-460E-94D1-54222C63F5DA}</a:tableStyleId>
+              </a:tblPr>
+              <a:tblGrid>
+                <a:gridCol w="3174075">
+                  <a:extLst>
+                    <a:ext uri="{9D8B030D-6E8A-4147-A177-3AD203B41FA5}">
+                      <a16:colId xmlns:a16="http://schemas.microsoft.com/office/drawing/2014/main" val="3632308337"/>
+                    </a:ext>
+                  </a:extLst>
+                </a:gridCol>
+                <a:gridCol w="3174075">
+                  <a:extLst>
+                    <a:ext uri="{9D8B030D-6E8A-4147-A177-3AD203B41FA5}">
+                      <a16:colId xmlns:a16="http://schemas.microsoft.com/office/drawing/2014/main" val="3161482999"/>
+                    </a:ext>
+                  </a:extLst>
+                </a:gridCol>
+                <a:gridCol w="3174075">
+                  <a:extLst>
+                    <a:ext uri="{9D8B030D-6E8A-4147-A177-3AD203B41FA5}">
+                      <a16:colId xmlns:a16="http://schemas.microsoft.com/office/drawing/2014/main" val="1464763851"/>
+                    </a:ext>
+                  </a:extLst>
+                </a:gridCol>
+                <a:gridCol w="3174075">
+                  <a:extLst>
+                    <a:ext uri="{9D8B030D-6E8A-4147-A177-3AD203B41FA5}">
+                      <a16:colId xmlns:a16="http://schemas.microsoft.com/office/drawing/2014/main" val="1517804166"/>
+                    </a:ext>
+                  </a:extLst>
+                </a:gridCol>
+              </a:tblGrid>
+              <a:tr h="1191198">
+                <a:tc>
+                  <a:txBody>
+                    <a:bodyPr/>
+                    <a:lstStyle/>
+                    <a:p>
+                      <a:endParaRPr lang="en-US" sz="3700" dirty="0"/>
+                    </a:p>
+                  </a:txBody>
+                  <a:tcPr marL="39676" marR="39676" marT="19838" marB="19838"/>
+                </a:tc>
+                <a:tc>
+                  <a:txBody>
+                    <a:bodyPr/>
+                    <a:lstStyle/>
+                    <a:p>
+                      <a:pPr marL="0" marR="0" lvl="0" indent="0" algn="l" defTabSz="4389120" rtl="0" eaLnBrk="1" fontAlgn="auto" latinLnBrk="0" hangingPunct="1">
+                        <a:lnSpc>
+                          <a:spcPct val="100000"/>
+                        </a:lnSpc>
+                        <a:spcBef>
+                          <a:spcPts val="0"/>
+                        </a:spcBef>
+                        <a:spcAft>
+                          <a:spcPts val="0"/>
+                        </a:spcAft>
+                        <a:buClrTx/>
+                        <a:buSzTx/>
+                        <a:buFontTx/>
+                        <a:buNone/>
+                        <a:tabLst/>
+                        <a:defRPr/>
+                      </a:pPr>
+                      <a:r>
+                        <a:rPr lang="en-US" sz="3600" dirty="0"/>
+                        <a:t>Estimate co-efficient</a:t>
+                      </a:r>
+                    </a:p>
+                  </a:txBody>
+                  <a:tcPr marL="39676" marR="39676" marT="19838" marB="19838"/>
+                </a:tc>
+                <a:tc>
+                  <a:txBody>
+                    <a:bodyPr/>
+                    <a:lstStyle/>
+                    <a:p>
+                      <a:r>
+                        <a:rPr lang="en-US" sz="3600" dirty="0"/>
+                        <a:t>Standard error</a:t>
+                      </a:r>
+                    </a:p>
+                  </a:txBody>
+                  <a:tcPr marL="39676" marR="39676" marT="19838" marB="19838"/>
+                </a:tc>
+                <a:tc>
+                  <a:txBody>
+                    <a:bodyPr/>
+                    <a:lstStyle/>
+                    <a:p>
+                      <a:r>
+                        <a:rPr lang="en-US" sz="3600" dirty="0"/>
+                        <a:t>P-value</a:t>
+                      </a:r>
+                    </a:p>
+                  </a:txBody>
+                  <a:tcPr marL="39676" marR="39676" marT="19838" marB="19838"/>
+                </a:tc>
+                <a:extLst>
+                  <a:ext uri="{0D108BD9-81ED-4DB2-BD59-A6C34878D82A}">
+                    <a16:rowId xmlns:a16="http://schemas.microsoft.com/office/drawing/2014/main" val="559417239"/>
+                  </a:ext>
+                </a:extLst>
+              </a:tr>
+              <a:tr h="1191198">
+                <a:tc>
+                  <a:txBody>
+                    <a:bodyPr/>
+                    <a:lstStyle/>
+                    <a:p>
+                      <a:r>
+                        <a:rPr lang="en-US" sz="3700" dirty="0"/>
+                        <a:t>Alpha power eyes open</a:t>
+                      </a:r>
+                    </a:p>
+                  </a:txBody>
+                  <a:tcPr marL="39676" marR="39676" marT="19838" marB="19838"/>
+                </a:tc>
+                <a:tc>
+                  <a:txBody>
+                    <a:bodyPr/>
+                    <a:lstStyle/>
+                    <a:p>
+                      <a:r>
+                        <a:rPr lang="en-US" sz="4400" dirty="0"/>
+                        <a:t>-39.7</a:t>
+                      </a:r>
+                    </a:p>
+                  </a:txBody>
+                  <a:tcPr marL="39676" marR="39676" marT="19838" marB="19838"/>
+                </a:tc>
+                <a:tc>
+                  <a:txBody>
+                    <a:bodyPr/>
+                    <a:lstStyle/>
+                    <a:p>
+                      <a:r>
+                        <a:rPr lang="en-US" sz="4400" dirty="0"/>
+                        <a:t>12.6</a:t>
+                      </a:r>
+                    </a:p>
+                  </a:txBody>
+                  <a:tcPr marL="39676" marR="39676" marT="19838" marB="19838"/>
+                </a:tc>
+                <a:tc>
+                  <a:txBody>
+                    <a:bodyPr/>
+                    <a:lstStyle/>
+                    <a:p>
+                      <a:r>
+                        <a:rPr lang="en-US" sz="4400" dirty="0"/>
+                        <a:t>0.008**</a:t>
+                      </a:r>
+                    </a:p>
+                  </a:txBody>
+                  <a:tcPr marL="39676" marR="39676" marT="19838" marB="19838"/>
+                </a:tc>
+                <a:extLst>
+                  <a:ext uri="{0D108BD9-81ED-4DB2-BD59-A6C34878D82A}">
+                    <a16:rowId xmlns:a16="http://schemas.microsoft.com/office/drawing/2014/main" val="2181573276"/>
+                  </a:ext>
+                </a:extLst>
+              </a:tr>
+              <a:tr h="1191198">
+                <a:tc>
+                  <a:txBody>
+                    <a:bodyPr/>
+                    <a:lstStyle/>
+                    <a:p>
+                      <a:r>
+                        <a:rPr lang="en-US" sz="3700" dirty="0"/>
+                        <a:t>Alpha power eyes closed</a:t>
+                      </a:r>
+                    </a:p>
+                  </a:txBody>
+                  <a:tcPr marL="39676" marR="39676" marT="19838" marB="19838"/>
+                </a:tc>
+                <a:tc>
+                  <a:txBody>
+                    <a:bodyPr/>
+                    <a:lstStyle/>
+                    <a:p>
+                      <a:r>
+                        <a:rPr lang="en-US" sz="4400" dirty="0"/>
+                        <a:t>19.0</a:t>
+                      </a:r>
+                    </a:p>
+                  </a:txBody>
+                  <a:tcPr marL="39676" marR="39676" marT="19838" marB="19838"/>
+                </a:tc>
+                <a:tc>
+                  <a:txBody>
+                    <a:bodyPr/>
+                    <a:lstStyle/>
+                    <a:p>
+                      <a:r>
+                        <a:rPr lang="en-US" sz="4400" dirty="0"/>
+                        <a:t>6.4</a:t>
+                      </a:r>
+                    </a:p>
+                  </a:txBody>
+                  <a:tcPr marL="39676" marR="39676" marT="19838" marB="19838"/>
+                </a:tc>
+                <a:tc>
+                  <a:txBody>
+                    <a:bodyPr/>
+                    <a:lstStyle/>
+                    <a:p>
+                      <a:r>
+                        <a:rPr lang="en-US" sz="4400" dirty="0"/>
+                        <a:t>0.01*</a:t>
+                      </a:r>
+                    </a:p>
+                  </a:txBody>
+                  <a:tcPr marL="39676" marR="39676" marT="19838" marB="19838"/>
+                </a:tc>
+                <a:extLst>
+                  <a:ext uri="{0D108BD9-81ED-4DB2-BD59-A6C34878D82A}">
+                    <a16:rowId xmlns:a16="http://schemas.microsoft.com/office/drawing/2014/main" val="1041974949"/>
+                  </a:ext>
+                </a:extLst>
+              </a:tr>
+            </a:tbl>
+          </a:graphicData>
+        </a:graphic>
+      </p:graphicFrame>
+      <p:sp>
+        <p:nvSpPr>
+          <p:cNvPr id="81" name="Content Placeholder 16"/>
+          <p:cNvSpPr>
+            <a:spLocks noGrp="1"/>
+          </p:cNvSpPr>
+          <p:nvPr>
+            <p:ph sz="quarter" idx="30"/>
+          </p:nvPr>
+        </p:nvSpPr>
+        <p:spPr>
+          <a:xfrm>
+            <a:off x="30915072" y="12178124"/>
+            <a:ext cx="12747714" cy="800292"/>
+          </a:xfrm>
+        </p:spPr>
+        <p:txBody>
+          <a:bodyPr>
+            <a:normAutofit fontScale="92500" lnSpcReduction="10000"/>
+          </a:bodyPr>
+          <a:lstStyle/>
+          <a:p>
+            <a:pPr marL="0" indent="0">
+              <a:buNone/>
+            </a:pPr>
+            <a:r>
+              <a:rPr lang="en-US" sz="2200" dirty="0"/>
+              <a:t>Table 1. Linear regression model (y=</a:t>
+            </a:r>
+            <a:r>
+              <a:rPr lang="el-GR" sz="2200" dirty="0"/>
+              <a:t>β</a:t>
+            </a:r>
+            <a:r>
+              <a:rPr lang="en-US" sz="2200" baseline="-25000" dirty="0"/>
+              <a:t>0</a:t>
+            </a:r>
+            <a:r>
+              <a:rPr lang="en-US" sz="2200" dirty="0"/>
+              <a:t>+</a:t>
+            </a:r>
+            <a:r>
+              <a:rPr lang="el-GR" sz="2200" dirty="0"/>
+              <a:t> β</a:t>
+            </a:r>
+            <a:r>
+              <a:rPr lang="en-US" sz="2200" baseline="-25000" dirty="0"/>
+              <a:t>1</a:t>
+            </a:r>
+            <a:r>
+              <a:rPr lang="en-US" sz="2200" dirty="0"/>
+              <a:t>X</a:t>
+            </a:r>
+            <a:r>
+              <a:rPr lang="en-US" sz="2200" baseline="-25000" dirty="0"/>
+              <a:t>1</a:t>
+            </a:r>
+            <a:r>
+              <a:rPr lang="en-US" sz="2200" dirty="0"/>
+              <a:t>+</a:t>
+            </a:r>
+            <a:r>
+              <a:rPr lang="el-GR" sz="2200" dirty="0"/>
+              <a:t> β</a:t>
+            </a:r>
+            <a:r>
+              <a:rPr lang="en-US" sz="2200" baseline="-25000" dirty="0"/>
+              <a:t>2</a:t>
+            </a:r>
+            <a:r>
+              <a:rPr lang="en-US" sz="2200" dirty="0"/>
+              <a:t>X</a:t>
+            </a:r>
+            <a:r>
+              <a:rPr lang="en-US" sz="2200" baseline="-25000" dirty="0"/>
+              <a:t>2</a:t>
+            </a:r>
+            <a:r>
+              <a:rPr lang="en-US" sz="2200" dirty="0"/>
+              <a:t>) where y=SNR-50 threshold, X</a:t>
+            </a:r>
+            <a:r>
+              <a:rPr lang="en-US" sz="2200" baseline="-25000" dirty="0"/>
+              <a:t>1</a:t>
+            </a:r>
+            <a:r>
+              <a:rPr lang="en-US" sz="2200" dirty="0"/>
+              <a:t>=alpha power eyes open, X</a:t>
+            </a:r>
+            <a:r>
+              <a:rPr lang="en-US" sz="2200" baseline="-25000" dirty="0"/>
+              <a:t>2</a:t>
+            </a:r>
+            <a:r>
+              <a:rPr lang="en-US" sz="2200" dirty="0"/>
+              <a:t>=alpha power eyes closed</a:t>
+            </a:r>
+            <a:endParaRPr lang="en-US" sz="2200" dirty="0"/>
+          </a:p>
+        </p:txBody>
+      </p:sp>
+      <p:sp>
+        <p:nvSpPr>
+          <p:cNvPr id="82" name="Content Placeholder 16"/>
+          <p:cNvSpPr>
+            <a:spLocks noGrp="1"/>
+          </p:cNvSpPr>
+          <p:nvPr>
+            <p:ph sz="quarter" idx="30"/>
+          </p:nvPr>
+        </p:nvSpPr>
+        <p:spPr>
+          <a:xfrm>
+            <a:off x="30443384" y="6970681"/>
+            <a:ext cx="13654293" cy="1493888"/>
+          </a:xfrm>
+        </p:spPr>
+        <p:txBody>
+          <a:bodyPr>
+            <a:normAutofit/>
+          </a:bodyPr>
+          <a:lstStyle/>
+          <a:p>
+            <a:pPr marL="0" indent="0">
+              <a:buNone/>
+            </a:pPr>
+            <a:r>
+              <a:rPr lang="en-US" sz="4400" b="1" dirty="0"/>
+              <a:t>SNR thresholds significantly associate with alpha power</a:t>
+            </a:r>
+          </a:p>
+        </p:txBody>
+      </p:sp>
     </p:spTree>
     <p:extLst>
       <p:ext uri="{BB962C8B-B14F-4D97-AF65-F5344CB8AC3E}">

</xml_diff>

<commit_message>
poster updates and comments
</commit_message>
<xml_diff>
--- a/AAS 2017/Alphapower_Poster.pptx
+++ b/AAS 2017/Alphapower_Poster.pptx
@@ -123,8 +123,22 @@
 
 <file path=ppt/commentAuthors.xml><?xml version="1.0" encoding="utf-8"?>
 <p:cmAuthorLst xmlns:a="http://schemas.openxmlformats.org/drawingml/2006/main" xmlns:r="http://schemas.openxmlformats.org/officeDocument/2006/relationships" xmlns:p="http://schemas.openxmlformats.org/presentationml/2006/main">
-  <p:cmAuthor id="2" name="Author" initials="A" lastIdx="1" clrIdx="1"/>
+  <p:cmAuthor id="2" name="Author" initials="A" lastIdx="2" clrIdx="1"/>
 </p:cmAuthorLst>
+</file>
+
+<file path=ppt/comments/comment1.xml><?xml version="1.0" encoding="utf-8"?>
+<p:cmLst xmlns:a="http://schemas.openxmlformats.org/drawingml/2006/main" xmlns:r="http://schemas.openxmlformats.org/officeDocument/2006/relationships" xmlns:p="http://schemas.openxmlformats.org/presentationml/2006/main">
+  <p:cm authorId="2" dt="2017-02-10T15:55:13.012" idx="2">
+    <p:pos x="10" y="10"/>
+    <p:text>Indicate which figures are eyes open and which are eyes closed. We need to delineate the low and high alpha participants. One way would be to highlight one column of figures a different background color.</p:text>
+    <p:extLst>
+      <p:ext uri="{C676402C-5697-4E1C-873F-D02D1690AC5C}">
+        <p15:threadingInfo xmlns:p15="http://schemas.microsoft.com/office/powerpoint/2012/main" timeZoneBias="480"/>
+      </p:ext>
+    </p:extLst>
+  </p:cm>
+</p:cmLst>
 </file>
 
 <file path=ppt/handoutMasters/handoutMaster1.xml><?xml version="1.0" encoding="utf-8"?>
@@ -4075,7 +4089,15 @@
             <a:pPr algn="just"/>
             <a:r>
               <a:rPr lang="en-US" sz="2400" dirty="0"/>
-              <a:t>Effects of aging and hearing loss on central inhibitory function could potentially contribute to poor speech in noise (SiN) performance</a:t>
+              <a:t>Effects of aging and hearing loss on central inhibitory function could potentially contribute to poor speech in noise (</a:t>
+            </a:r>
+            <a:r>
+              <a:rPr lang="en-US" sz="2400" dirty="0" smtClean="0"/>
+              <a:t>SIN</a:t>
+            </a:r>
+            <a:r>
+              <a:rPr lang="en-US" sz="2400" dirty="0"/>
+              <a:t>) performance</a:t>
             </a:r>
           </a:p>
           <a:p>
@@ -4089,7 +4111,31 @@
             <a:pPr algn="just"/>
             <a:r>
               <a:rPr lang="en-US" sz="2400" dirty="0"/>
-              <a:t>Alpha rhythms effects on SiN testing has been well studied, but less is known about how individual resting state alpha relates to SiN performance.</a:t>
+              <a:t>Alpha rhythms </a:t>
+            </a:r>
+            <a:r>
+              <a:rPr lang="en-US" sz="2400" dirty="0" smtClean="0"/>
+              <a:t>effect </a:t>
+            </a:r>
+            <a:r>
+              <a:rPr lang="en-US" sz="2400" dirty="0"/>
+              <a:t>on </a:t>
+            </a:r>
+            <a:r>
+              <a:rPr lang="en-US" sz="2400" dirty="0" smtClean="0"/>
+              <a:t>SIN </a:t>
+            </a:r>
+            <a:r>
+              <a:rPr lang="en-US" sz="2400" dirty="0"/>
+              <a:t>testing has been well studied, but less is known about how individual resting state alpha relates to </a:t>
+            </a:r>
+            <a:r>
+              <a:rPr lang="en-US" sz="2400" dirty="0" smtClean="0"/>
+              <a:t>SIN </a:t>
+            </a:r>
+            <a:r>
+              <a:rPr lang="en-US" sz="2400" dirty="0"/>
+              <a:t>performance.</a:t>
             </a:r>
           </a:p>
           <a:p>
@@ -4103,7 +4149,23 @@
             <a:pPr algn="just"/>
             <a:r>
               <a:rPr lang="en-US" sz="2400" dirty="0"/>
-              <a:t>Purpose of the present study was to examine if an individual’s inhibitory function, as defined by their resting state alpha activity, would predict sentences in noise (SNR) thresholds</a:t>
+              <a:t>Purpose of the present study was to examine if an individual’s inhibitory function, as defined by their resting state alpha activity, would predict </a:t>
+            </a:r>
+            <a:r>
+              <a:rPr lang="en-US" sz="2400" dirty="0" smtClean="0"/>
+              <a:t>signal to </a:t>
+            </a:r>
+            <a:r>
+              <a:rPr lang="en-US" sz="2400" dirty="0"/>
+              <a:t>noise </a:t>
+            </a:r>
+            <a:r>
+              <a:rPr lang="en-US" sz="2400" dirty="0" smtClean="0"/>
+              <a:t>ratio (SNR</a:t>
+            </a:r>
+            <a:r>
+              <a:rPr lang="en-US" sz="2400" dirty="0"/>
+              <a:t>) thresholds</a:t>
             </a:r>
           </a:p>
           <a:p>
@@ -6124,28 +6186,28 @@
                 <a:gridCol w="3174075">
                   <a:extLst>
                     <a:ext uri="{9D8B030D-6E8A-4147-A177-3AD203B41FA5}">
-                      <a16:colId xmlns:a16="http://schemas.microsoft.com/office/drawing/2014/main" val="3632308337"/>
+                      <a16:colId xmlns="" xmlns:a16="http://schemas.microsoft.com/office/drawing/2014/main" val="3632308337"/>
                     </a:ext>
                   </a:extLst>
                 </a:gridCol>
                 <a:gridCol w="3174075">
                   <a:extLst>
                     <a:ext uri="{9D8B030D-6E8A-4147-A177-3AD203B41FA5}">
-                      <a16:colId xmlns:a16="http://schemas.microsoft.com/office/drawing/2014/main" val="3161482999"/>
+                      <a16:colId xmlns="" xmlns:a16="http://schemas.microsoft.com/office/drawing/2014/main" val="3161482999"/>
                     </a:ext>
                   </a:extLst>
                 </a:gridCol>
                 <a:gridCol w="3174075">
                   <a:extLst>
                     <a:ext uri="{9D8B030D-6E8A-4147-A177-3AD203B41FA5}">
-                      <a16:colId xmlns:a16="http://schemas.microsoft.com/office/drawing/2014/main" val="1464763851"/>
+                      <a16:colId xmlns="" xmlns:a16="http://schemas.microsoft.com/office/drawing/2014/main" val="1464763851"/>
                     </a:ext>
                   </a:extLst>
                 </a:gridCol>
                 <a:gridCol w="3174075">
                   <a:extLst>
                     <a:ext uri="{9D8B030D-6E8A-4147-A177-3AD203B41FA5}">
-                      <a16:colId xmlns:a16="http://schemas.microsoft.com/office/drawing/2014/main" val="1517804166"/>
+                      <a16:colId xmlns="" xmlns:a16="http://schemas.microsoft.com/office/drawing/2014/main" val="1517804166"/>
                     </a:ext>
                   </a:extLst>
                 </a:gridCol>
@@ -6219,7 +6281,7 @@
                 </a:tc>
                 <a:extLst>
                   <a:ext uri="{0D108BD9-81ED-4DB2-BD59-A6C34878D82A}">
-                    <a16:rowId xmlns:a16="http://schemas.microsoft.com/office/drawing/2014/main" val="559417239"/>
+                    <a16:rowId xmlns="" xmlns:a16="http://schemas.microsoft.com/office/drawing/2014/main" val="559417239"/>
                   </a:ext>
                 </a:extLst>
               </a:tr>
@@ -6278,7 +6340,7 @@
                 </a:tc>
                 <a:extLst>
                   <a:ext uri="{0D108BD9-81ED-4DB2-BD59-A6C34878D82A}">
-                    <a16:rowId xmlns:a16="http://schemas.microsoft.com/office/drawing/2014/main" val="2181573276"/>
+                    <a16:rowId xmlns="" xmlns:a16="http://schemas.microsoft.com/office/drawing/2014/main" val="2181573276"/>
                   </a:ext>
                 </a:extLst>
               </a:tr>
@@ -6337,7 +6399,7 @@
                 </a:tc>
                 <a:extLst>
                   <a:ext uri="{0D108BD9-81ED-4DB2-BD59-A6C34878D82A}">
-                    <a16:rowId xmlns:a16="http://schemas.microsoft.com/office/drawing/2014/main" val="1041974949"/>
+                    <a16:rowId xmlns="" xmlns:a16="http://schemas.microsoft.com/office/drawing/2014/main" val="1041974949"/>
                   </a:ext>
                 </a:extLst>
               </a:tr>
@@ -6442,7 +6504,6 @@
               <a:rPr lang="en-US" sz="2200" dirty="0"/>
               <a:t>=alpha power eyes closed</a:t>
             </a:r>
-            <a:endParaRPr lang="en-US" sz="2200" dirty="0"/>
           </a:p>
         </p:txBody>
       </p:sp>

</xml_diff>